<commit_message>
populated graph and notebook
</commit_message>
<xml_diff>
--- a/Practice/P41171/Artur_Gogiyan/presentation.pptx
+++ b/Practice/P41171/Artur_Gogiyan/presentation.pptx
@@ -14,7 +14,7 @@
     <p:sldId id="261" r:id="rId9"/>
   </p:sldIdLst>
   <p:sldSz cx="9144000" cy="5143500"/>
-  <p:notesSz cx="6858000" cy="9144000"/>
+  <p:notesSz cx="7772400" cy="10058400"/>
 </p:presentation>
 </file>
 
@@ -59,7 +59,7 @@
       </p:grpSpPr>
       <p:sp>
         <p:nvSpPr>
-          <p:cNvPr id="30" name="PlaceHolder 1"/>
+          <p:cNvPr id="29" name="PlaceHolder 1"/>
           <p:cNvSpPr>
             <a:spLocks noGrp="1"/>
           </p:cNvSpPr>
@@ -70,7 +70,7 @@
         <p:spPr>
           <a:xfrm>
             <a:off x="1297440" y="393840"/>
-            <a:ext cx="7038720" cy="913680"/>
+            <a:ext cx="7038360" cy="913320"/>
           </a:xfrm>
           <a:prstGeom prst="rect">
             <a:avLst/>
@@ -81,18 +81,16 @@
             <a:noAutofit/>
           </a:bodyPr>
           <a:p>
-            <a:endParaRPr b="0" lang="en-US" sz="1400" spc="-1" strike="noStrike">
-              <a:solidFill>
-                <a:srgbClr val="000000"/>
-              </a:solidFill>
-              <a:latin typeface="Arial"/>
-            </a:endParaRPr>
-          </a:p>
-        </p:txBody>
-      </p:sp>
-      <p:sp>
-        <p:nvSpPr>
-          <p:cNvPr id="31" name="PlaceHolder 2"/>
+            <a:pPr algn="ctr"/>
+            <a:endParaRPr b="0" lang="en-US" sz="4400" spc="-1" strike="noStrike">
+              <a:latin typeface="Arial"/>
+            </a:endParaRPr>
+          </a:p>
+        </p:txBody>
+      </p:sp>
+      <p:sp>
+        <p:nvSpPr>
+          <p:cNvPr id="30" name="PlaceHolder 2"/>
           <p:cNvSpPr>
             <a:spLocks noGrp="1"/>
           </p:cNvSpPr>
@@ -103,7 +101,7 @@
         <p:spPr>
           <a:xfrm>
             <a:off x="1297440" y="1567440"/>
-            <a:ext cx="7038720" cy="1388160"/>
+            <a:ext cx="7038360" cy="1388160"/>
           </a:xfrm>
           <a:prstGeom prst="rect">
             <a:avLst/>
@@ -114,18 +112,15 @@
             <a:normAutofit/>
           </a:bodyPr>
           <a:p>
-            <a:endParaRPr b="0" lang="en-US" sz="1400" spc="-1" strike="noStrike">
-              <a:solidFill>
-                <a:srgbClr val="000000"/>
-              </a:solidFill>
-              <a:latin typeface="Arial"/>
-            </a:endParaRPr>
-          </a:p>
-        </p:txBody>
-      </p:sp>
-      <p:sp>
-        <p:nvSpPr>
-          <p:cNvPr id="32" name="PlaceHolder 3"/>
+            <a:endParaRPr b="0" lang="en-US" sz="3200" spc="-1" strike="noStrike">
+              <a:latin typeface="Arial"/>
+            </a:endParaRPr>
+          </a:p>
+        </p:txBody>
+      </p:sp>
+      <p:sp>
+        <p:nvSpPr>
+          <p:cNvPr id="31" name="PlaceHolder 3"/>
           <p:cNvSpPr>
             <a:spLocks noGrp="1"/>
           </p:cNvSpPr>
@@ -136,7 +131,7 @@
         <p:spPr>
           <a:xfrm>
             <a:off x="1297440" y="3087720"/>
-            <a:ext cx="7038720" cy="1388160"/>
+            <a:ext cx="7038360" cy="1388160"/>
           </a:xfrm>
           <a:prstGeom prst="rect">
             <a:avLst/>
@@ -147,10 +142,7 @@
             <a:normAutofit/>
           </a:bodyPr>
           <a:p>
-            <a:endParaRPr b="0" lang="en-US" sz="1400" spc="-1" strike="noStrike">
-              <a:solidFill>
-                <a:srgbClr val="000000"/>
-              </a:solidFill>
+            <a:endParaRPr b="0" lang="en-US" sz="3200" spc="-1" strike="noStrike">
               <a:latin typeface="Arial"/>
             </a:endParaRPr>
           </a:p>
@@ -180,7 +172,7 @@
       </p:grpSpPr>
       <p:sp>
         <p:nvSpPr>
-          <p:cNvPr id="33" name="PlaceHolder 1"/>
+          <p:cNvPr id="32" name="PlaceHolder 1"/>
           <p:cNvSpPr>
             <a:spLocks noGrp="1"/>
           </p:cNvSpPr>
@@ -191,7 +183,7 @@
         <p:spPr>
           <a:xfrm>
             <a:off x="1297440" y="393840"/>
-            <a:ext cx="7038720" cy="913680"/>
+            <a:ext cx="7038360" cy="913320"/>
           </a:xfrm>
           <a:prstGeom prst="rect">
             <a:avLst/>
@@ -202,18 +194,16 @@
             <a:noAutofit/>
           </a:bodyPr>
           <a:p>
-            <a:endParaRPr b="0" lang="en-US" sz="1400" spc="-1" strike="noStrike">
-              <a:solidFill>
-                <a:srgbClr val="000000"/>
-              </a:solidFill>
-              <a:latin typeface="Arial"/>
-            </a:endParaRPr>
-          </a:p>
-        </p:txBody>
-      </p:sp>
-      <p:sp>
-        <p:nvSpPr>
-          <p:cNvPr id="34" name="PlaceHolder 2"/>
+            <a:pPr algn="ctr"/>
+            <a:endParaRPr b="0" lang="en-US" sz="4400" spc="-1" strike="noStrike">
+              <a:latin typeface="Arial"/>
+            </a:endParaRPr>
+          </a:p>
+        </p:txBody>
+      </p:sp>
+      <p:sp>
+        <p:nvSpPr>
+          <p:cNvPr id="33" name="PlaceHolder 2"/>
           <p:cNvSpPr>
             <a:spLocks noGrp="1"/>
           </p:cNvSpPr>
@@ -224,7 +214,7 @@
         <p:spPr>
           <a:xfrm>
             <a:off x="1297440" y="1567440"/>
-            <a:ext cx="3434760" cy="1388160"/>
+            <a:ext cx="3434400" cy="1388160"/>
           </a:xfrm>
           <a:prstGeom prst="rect">
             <a:avLst/>
@@ -235,18 +225,15 @@
             <a:normAutofit/>
           </a:bodyPr>
           <a:p>
-            <a:endParaRPr b="0" lang="en-US" sz="1400" spc="-1" strike="noStrike">
-              <a:solidFill>
-                <a:srgbClr val="000000"/>
-              </a:solidFill>
-              <a:latin typeface="Arial"/>
-            </a:endParaRPr>
-          </a:p>
-        </p:txBody>
-      </p:sp>
-      <p:sp>
-        <p:nvSpPr>
-          <p:cNvPr id="35" name="PlaceHolder 3"/>
+            <a:endParaRPr b="0" lang="en-US" sz="3200" spc="-1" strike="noStrike">
+              <a:latin typeface="Arial"/>
+            </a:endParaRPr>
+          </a:p>
+        </p:txBody>
+      </p:sp>
+      <p:sp>
+        <p:nvSpPr>
+          <p:cNvPr id="34" name="PlaceHolder 3"/>
           <p:cNvSpPr>
             <a:spLocks noGrp="1"/>
           </p:cNvSpPr>
@@ -256,8 +243,8 @@
         </p:nvSpPr>
         <p:spPr>
           <a:xfrm>
-            <a:off x="4904280" y="1567440"/>
-            <a:ext cx="3434760" cy="1388160"/>
+            <a:off x="4903920" y="1567440"/>
+            <a:ext cx="3434400" cy="1388160"/>
           </a:xfrm>
           <a:prstGeom prst="rect">
             <a:avLst/>
@@ -268,18 +255,15 @@
             <a:normAutofit/>
           </a:bodyPr>
           <a:p>
-            <a:endParaRPr b="0" lang="en-US" sz="1400" spc="-1" strike="noStrike">
-              <a:solidFill>
-                <a:srgbClr val="000000"/>
-              </a:solidFill>
-              <a:latin typeface="Arial"/>
-            </a:endParaRPr>
-          </a:p>
-        </p:txBody>
-      </p:sp>
-      <p:sp>
-        <p:nvSpPr>
-          <p:cNvPr id="36" name="PlaceHolder 4"/>
+            <a:endParaRPr b="0" lang="en-US" sz="3200" spc="-1" strike="noStrike">
+              <a:latin typeface="Arial"/>
+            </a:endParaRPr>
+          </a:p>
+        </p:txBody>
+      </p:sp>
+      <p:sp>
+        <p:nvSpPr>
+          <p:cNvPr id="35" name="PlaceHolder 4"/>
           <p:cNvSpPr>
             <a:spLocks noGrp="1"/>
           </p:cNvSpPr>
@@ -290,7 +274,7 @@
         <p:spPr>
           <a:xfrm>
             <a:off x="1297440" y="3087720"/>
-            <a:ext cx="3434760" cy="1388160"/>
+            <a:ext cx="3434400" cy="1388160"/>
           </a:xfrm>
           <a:prstGeom prst="rect">
             <a:avLst/>
@@ -301,18 +285,15 @@
             <a:normAutofit/>
           </a:bodyPr>
           <a:p>
-            <a:endParaRPr b="0" lang="en-US" sz="1400" spc="-1" strike="noStrike">
-              <a:solidFill>
-                <a:srgbClr val="000000"/>
-              </a:solidFill>
-              <a:latin typeface="Arial"/>
-            </a:endParaRPr>
-          </a:p>
-        </p:txBody>
-      </p:sp>
-      <p:sp>
-        <p:nvSpPr>
-          <p:cNvPr id="37" name="PlaceHolder 5"/>
+            <a:endParaRPr b="0" lang="en-US" sz="3200" spc="-1" strike="noStrike">
+              <a:latin typeface="Arial"/>
+            </a:endParaRPr>
+          </a:p>
+        </p:txBody>
+      </p:sp>
+      <p:sp>
+        <p:nvSpPr>
+          <p:cNvPr id="36" name="PlaceHolder 5"/>
           <p:cNvSpPr>
             <a:spLocks noGrp="1"/>
           </p:cNvSpPr>
@@ -322,8 +303,8 @@
         </p:nvSpPr>
         <p:spPr>
           <a:xfrm>
-            <a:off x="4904280" y="3087720"/>
-            <a:ext cx="3434760" cy="1388160"/>
+            <a:off x="4903920" y="3087720"/>
+            <a:ext cx="3434400" cy="1388160"/>
           </a:xfrm>
           <a:prstGeom prst="rect">
             <a:avLst/>
@@ -334,10 +315,7 @@
             <a:normAutofit/>
           </a:bodyPr>
           <a:p>
-            <a:endParaRPr b="0" lang="en-US" sz="1400" spc="-1" strike="noStrike">
-              <a:solidFill>
-                <a:srgbClr val="000000"/>
-              </a:solidFill>
+            <a:endParaRPr b="0" lang="en-US" sz="3200" spc="-1" strike="noStrike">
               <a:latin typeface="Arial"/>
             </a:endParaRPr>
           </a:p>
@@ -367,7 +345,7 @@
       </p:grpSpPr>
       <p:sp>
         <p:nvSpPr>
-          <p:cNvPr id="38" name="PlaceHolder 1"/>
+          <p:cNvPr id="37" name="PlaceHolder 1"/>
           <p:cNvSpPr>
             <a:spLocks noGrp="1"/>
           </p:cNvSpPr>
@@ -378,7 +356,7 @@
         <p:spPr>
           <a:xfrm>
             <a:off x="1297440" y="393840"/>
-            <a:ext cx="7038720" cy="913680"/>
+            <a:ext cx="7038360" cy="913320"/>
           </a:xfrm>
           <a:prstGeom prst="rect">
             <a:avLst/>
@@ -389,18 +367,16 @@
             <a:noAutofit/>
           </a:bodyPr>
           <a:p>
-            <a:endParaRPr b="0" lang="en-US" sz="1400" spc="-1" strike="noStrike">
-              <a:solidFill>
-                <a:srgbClr val="000000"/>
-              </a:solidFill>
-              <a:latin typeface="Arial"/>
-            </a:endParaRPr>
-          </a:p>
-        </p:txBody>
-      </p:sp>
-      <p:sp>
-        <p:nvSpPr>
-          <p:cNvPr id="39" name="PlaceHolder 2"/>
+            <a:pPr algn="ctr"/>
+            <a:endParaRPr b="0" lang="en-US" sz="4400" spc="-1" strike="noStrike">
+              <a:latin typeface="Arial"/>
+            </a:endParaRPr>
+          </a:p>
+        </p:txBody>
+      </p:sp>
+      <p:sp>
+        <p:nvSpPr>
+          <p:cNvPr id="38" name="PlaceHolder 2"/>
           <p:cNvSpPr>
             <a:spLocks noGrp="1"/>
           </p:cNvSpPr>
@@ -422,18 +398,15 @@
             <a:normAutofit/>
           </a:bodyPr>
           <a:p>
-            <a:endParaRPr b="0" lang="en-US" sz="1400" spc="-1" strike="noStrike">
-              <a:solidFill>
-                <a:srgbClr val="000000"/>
-              </a:solidFill>
-              <a:latin typeface="Arial"/>
-            </a:endParaRPr>
-          </a:p>
-        </p:txBody>
-      </p:sp>
-      <p:sp>
-        <p:nvSpPr>
-          <p:cNvPr id="40" name="PlaceHolder 3"/>
+            <a:endParaRPr b="0" lang="en-US" sz="3200" spc="-1" strike="noStrike">
+              <a:latin typeface="Arial"/>
+            </a:endParaRPr>
+          </a:p>
+        </p:txBody>
+      </p:sp>
+      <p:sp>
+        <p:nvSpPr>
+          <p:cNvPr id="39" name="PlaceHolder 3"/>
           <p:cNvSpPr>
             <a:spLocks noGrp="1"/>
           </p:cNvSpPr>
@@ -455,18 +428,15 @@
             <a:normAutofit/>
           </a:bodyPr>
           <a:p>
-            <a:endParaRPr b="0" lang="en-US" sz="1400" spc="-1" strike="noStrike">
-              <a:solidFill>
-                <a:srgbClr val="000000"/>
-              </a:solidFill>
-              <a:latin typeface="Arial"/>
-            </a:endParaRPr>
-          </a:p>
-        </p:txBody>
-      </p:sp>
-      <p:sp>
-        <p:nvSpPr>
-          <p:cNvPr id="41" name="PlaceHolder 4"/>
+            <a:endParaRPr b="0" lang="en-US" sz="3200" spc="-1" strike="noStrike">
+              <a:latin typeface="Arial"/>
+            </a:endParaRPr>
+          </a:p>
+        </p:txBody>
+      </p:sp>
+      <p:sp>
+        <p:nvSpPr>
+          <p:cNvPr id="40" name="PlaceHolder 4"/>
           <p:cNvSpPr>
             <a:spLocks noGrp="1"/>
           </p:cNvSpPr>
@@ -488,18 +458,15 @@
             <a:normAutofit/>
           </a:bodyPr>
           <a:p>
-            <a:endParaRPr b="0" lang="en-US" sz="1400" spc="-1" strike="noStrike">
-              <a:solidFill>
-                <a:srgbClr val="000000"/>
-              </a:solidFill>
-              <a:latin typeface="Arial"/>
-            </a:endParaRPr>
-          </a:p>
-        </p:txBody>
-      </p:sp>
-      <p:sp>
-        <p:nvSpPr>
-          <p:cNvPr id="42" name="PlaceHolder 5"/>
+            <a:endParaRPr b="0" lang="en-US" sz="3200" spc="-1" strike="noStrike">
+              <a:latin typeface="Arial"/>
+            </a:endParaRPr>
+          </a:p>
+        </p:txBody>
+      </p:sp>
+      <p:sp>
+        <p:nvSpPr>
+          <p:cNvPr id="41" name="PlaceHolder 5"/>
           <p:cNvSpPr>
             <a:spLocks noGrp="1"/>
           </p:cNvSpPr>
@@ -521,18 +488,15 @@
             <a:normAutofit/>
           </a:bodyPr>
           <a:p>
-            <a:endParaRPr b="0" lang="en-US" sz="1400" spc="-1" strike="noStrike">
-              <a:solidFill>
-                <a:srgbClr val="000000"/>
-              </a:solidFill>
-              <a:latin typeface="Arial"/>
-            </a:endParaRPr>
-          </a:p>
-        </p:txBody>
-      </p:sp>
-      <p:sp>
-        <p:nvSpPr>
-          <p:cNvPr id="43" name="PlaceHolder 6"/>
+            <a:endParaRPr b="0" lang="en-US" sz="3200" spc="-1" strike="noStrike">
+              <a:latin typeface="Arial"/>
+            </a:endParaRPr>
+          </a:p>
+        </p:txBody>
+      </p:sp>
+      <p:sp>
+        <p:nvSpPr>
+          <p:cNvPr id="42" name="PlaceHolder 6"/>
           <p:cNvSpPr>
             <a:spLocks noGrp="1"/>
           </p:cNvSpPr>
@@ -554,18 +518,15 @@
             <a:normAutofit/>
           </a:bodyPr>
           <a:p>
-            <a:endParaRPr b="0" lang="en-US" sz="1400" spc="-1" strike="noStrike">
-              <a:solidFill>
-                <a:srgbClr val="000000"/>
-              </a:solidFill>
-              <a:latin typeface="Arial"/>
-            </a:endParaRPr>
-          </a:p>
-        </p:txBody>
-      </p:sp>
-      <p:sp>
-        <p:nvSpPr>
-          <p:cNvPr id="44" name="PlaceHolder 7"/>
+            <a:endParaRPr b="0" lang="en-US" sz="3200" spc="-1" strike="noStrike">
+              <a:latin typeface="Arial"/>
+            </a:endParaRPr>
+          </a:p>
+        </p:txBody>
+      </p:sp>
+      <p:sp>
+        <p:nvSpPr>
+          <p:cNvPr id="43" name="PlaceHolder 7"/>
           <p:cNvSpPr>
             <a:spLocks noGrp="1"/>
           </p:cNvSpPr>
@@ -587,10 +548,7 @@
             <a:normAutofit/>
           </a:bodyPr>
           <a:p>
-            <a:endParaRPr b="0" lang="en-US" sz="1400" spc="-1" strike="noStrike">
-              <a:solidFill>
-                <a:srgbClr val="000000"/>
-              </a:solidFill>
+            <a:endParaRPr b="0" lang="en-US" sz="3200" spc="-1" strike="noStrike">
               <a:latin typeface="Arial"/>
             </a:endParaRPr>
           </a:p>
@@ -642,7 +600,7 @@
       </p:grpSpPr>
       <p:sp>
         <p:nvSpPr>
-          <p:cNvPr id="51" name="PlaceHolder 1"/>
+          <p:cNvPr id="49" name="PlaceHolder 1"/>
           <p:cNvSpPr>
             <a:spLocks noGrp="1"/>
           </p:cNvSpPr>
@@ -653,7 +611,7 @@
         <p:spPr>
           <a:xfrm>
             <a:off x="1297440" y="393840"/>
-            <a:ext cx="7038720" cy="913680"/>
+            <a:ext cx="7038360" cy="913320"/>
           </a:xfrm>
           <a:prstGeom prst="rect">
             <a:avLst/>
@@ -664,18 +622,16 @@
             <a:noAutofit/>
           </a:bodyPr>
           <a:p>
-            <a:endParaRPr b="0" lang="en-US" sz="1400" spc="-1" strike="noStrike">
-              <a:solidFill>
-                <a:srgbClr val="000000"/>
-              </a:solidFill>
-              <a:latin typeface="Arial"/>
-            </a:endParaRPr>
-          </a:p>
-        </p:txBody>
-      </p:sp>
-      <p:sp>
-        <p:nvSpPr>
-          <p:cNvPr id="52" name="PlaceHolder 2"/>
+            <a:pPr algn="ctr"/>
+            <a:endParaRPr b="0" lang="en-US" sz="4400" spc="-1" strike="noStrike">
+              <a:latin typeface="Arial"/>
+            </a:endParaRPr>
+          </a:p>
+        </p:txBody>
+      </p:sp>
+      <p:sp>
+        <p:nvSpPr>
+          <p:cNvPr id="50" name="PlaceHolder 2"/>
           <p:cNvSpPr>
             <a:spLocks noGrp="1"/>
           </p:cNvSpPr>
@@ -686,7 +642,7 @@
         <p:spPr>
           <a:xfrm>
             <a:off x="1297440" y="1567440"/>
-            <a:ext cx="7038720" cy="2910960"/>
+            <a:ext cx="7038360" cy="2910600"/>
           </a:xfrm>
           <a:prstGeom prst="rect">
             <a:avLst/>
@@ -728,7 +684,7 @@
       </p:grpSpPr>
       <p:sp>
         <p:nvSpPr>
-          <p:cNvPr id="53" name="PlaceHolder 1"/>
+          <p:cNvPr id="51" name="PlaceHolder 1"/>
           <p:cNvSpPr>
             <a:spLocks noGrp="1"/>
           </p:cNvSpPr>
@@ -739,7 +695,7 @@
         <p:spPr>
           <a:xfrm>
             <a:off x="1297440" y="393840"/>
-            <a:ext cx="7038720" cy="913680"/>
+            <a:ext cx="7038360" cy="913320"/>
           </a:xfrm>
           <a:prstGeom prst="rect">
             <a:avLst/>
@@ -750,18 +706,16 @@
             <a:noAutofit/>
           </a:bodyPr>
           <a:p>
-            <a:endParaRPr b="0" lang="en-US" sz="1400" spc="-1" strike="noStrike">
-              <a:solidFill>
-                <a:srgbClr val="000000"/>
-              </a:solidFill>
-              <a:latin typeface="Arial"/>
-            </a:endParaRPr>
-          </a:p>
-        </p:txBody>
-      </p:sp>
-      <p:sp>
-        <p:nvSpPr>
-          <p:cNvPr id="54" name="PlaceHolder 2"/>
+            <a:pPr algn="ctr"/>
+            <a:endParaRPr b="0" lang="en-US" sz="4400" spc="-1" strike="noStrike">
+              <a:latin typeface="Arial"/>
+            </a:endParaRPr>
+          </a:p>
+        </p:txBody>
+      </p:sp>
+      <p:sp>
+        <p:nvSpPr>
+          <p:cNvPr id="52" name="PlaceHolder 2"/>
           <p:cNvSpPr>
             <a:spLocks noGrp="1"/>
           </p:cNvSpPr>
@@ -772,7 +726,7 @@
         <p:spPr>
           <a:xfrm>
             <a:off x="1297440" y="1567440"/>
-            <a:ext cx="7038720" cy="2910960"/>
+            <a:ext cx="7038360" cy="2910600"/>
           </a:xfrm>
           <a:prstGeom prst="rect">
             <a:avLst/>
@@ -783,10 +737,7 @@
             <a:normAutofit/>
           </a:bodyPr>
           <a:p>
-            <a:endParaRPr b="0" lang="en-US" sz="1400" spc="-1" strike="noStrike">
-              <a:solidFill>
-                <a:srgbClr val="000000"/>
-              </a:solidFill>
+            <a:endParaRPr b="0" lang="en-US" sz="3200" spc="-1" strike="noStrike">
               <a:latin typeface="Arial"/>
             </a:endParaRPr>
           </a:p>
@@ -816,7 +767,7 @@
       </p:grpSpPr>
       <p:sp>
         <p:nvSpPr>
-          <p:cNvPr id="55" name="PlaceHolder 1"/>
+          <p:cNvPr id="53" name="PlaceHolder 1"/>
           <p:cNvSpPr>
             <a:spLocks noGrp="1"/>
           </p:cNvSpPr>
@@ -827,7 +778,7 @@
         <p:spPr>
           <a:xfrm>
             <a:off x="1297440" y="393840"/>
-            <a:ext cx="7038720" cy="913680"/>
+            <a:ext cx="7038360" cy="913320"/>
           </a:xfrm>
           <a:prstGeom prst="rect">
             <a:avLst/>
@@ -838,18 +789,16 @@
             <a:noAutofit/>
           </a:bodyPr>
           <a:p>
-            <a:endParaRPr b="0" lang="en-US" sz="1400" spc="-1" strike="noStrike">
-              <a:solidFill>
-                <a:srgbClr val="000000"/>
-              </a:solidFill>
-              <a:latin typeface="Arial"/>
-            </a:endParaRPr>
-          </a:p>
-        </p:txBody>
-      </p:sp>
-      <p:sp>
-        <p:nvSpPr>
-          <p:cNvPr id="56" name="PlaceHolder 2"/>
+            <a:pPr algn="ctr"/>
+            <a:endParaRPr b="0" lang="en-US" sz="4400" spc="-1" strike="noStrike">
+              <a:latin typeface="Arial"/>
+            </a:endParaRPr>
+          </a:p>
+        </p:txBody>
+      </p:sp>
+      <p:sp>
+        <p:nvSpPr>
+          <p:cNvPr id="54" name="PlaceHolder 2"/>
           <p:cNvSpPr>
             <a:spLocks noGrp="1"/>
           </p:cNvSpPr>
@@ -860,7 +809,7 @@
         <p:spPr>
           <a:xfrm>
             <a:off x="1297440" y="1567440"/>
-            <a:ext cx="3434760" cy="2910960"/>
+            <a:ext cx="3434400" cy="2910600"/>
           </a:xfrm>
           <a:prstGeom prst="rect">
             <a:avLst/>
@@ -871,18 +820,15 @@
             <a:normAutofit/>
           </a:bodyPr>
           <a:p>
-            <a:endParaRPr b="0" lang="en-US" sz="1400" spc="-1" strike="noStrike">
-              <a:solidFill>
-                <a:srgbClr val="000000"/>
-              </a:solidFill>
-              <a:latin typeface="Arial"/>
-            </a:endParaRPr>
-          </a:p>
-        </p:txBody>
-      </p:sp>
-      <p:sp>
-        <p:nvSpPr>
-          <p:cNvPr id="57" name="PlaceHolder 3"/>
+            <a:endParaRPr b="0" lang="en-US" sz="3200" spc="-1" strike="noStrike">
+              <a:latin typeface="Arial"/>
+            </a:endParaRPr>
+          </a:p>
+        </p:txBody>
+      </p:sp>
+      <p:sp>
+        <p:nvSpPr>
+          <p:cNvPr id="55" name="PlaceHolder 3"/>
           <p:cNvSpPr>
             <a:spLocks noGrp="1"/>
           </p:cNvSpPr>
@@ -892,8 +838,8 @@
         </p:nvSpPr>
         <p:spPr>
           <a:xfrm>
-            <a:off x="4904280" y="1567440"/>
-            <a:ext cx="3434760" cy="2910960"/>
+            <a:off x="4903920" y="1567440"/>
+            <a:ext cx="3434400" cy="2910600"/>
           </a:xfrm>
           <a:prstGeom prst="rect">
             <a:avLst/>
@@ -904,10 +850,7 @@
             <a:normAutofit/>
           </a:bodyPr>
           <a:p>
-            <a:endParaRPr b="0" lang="en-US" sz="1400" spc="-1" strike="noStrike">
-              <a:solidFill>
-                <a:srgbClr val="000000"/>
-              </a:solidFill>
+            <a:endParaRPr b="0" lang="en-US" sz="3200" spc="-1" strike="noStrike">
               <a:latin typeface="Arial"/>
             </a:endParaRPr>
           </a:p>
@@ -937,7 +880,7 @@
       </p:grpSpPr>
       <p:sp>
         <p:nvSpPr>
-          <p:cNvPr id="58" name="PlaceHolder 1"/>
+          <p:cNvPr id="56" name="PlaceHolder 1"/>
           <p:cNvSpPr>
             <a:spLocks noGrp="1"/>
           </p:cNvSpPr>
@@ -948,7 +891,7 @@
         <p:spPr>
           <a:xfrm>
             <a:off x="1297440" y="393840"/>
-            <a:ext cx="7038720" cy="913680"/>
+            <a:ext cx="7038360" cy="913320"/>
           </a:xfrm>
           <a:prstGeom prst="rect">
             <a:avLst/>
@@ -959,10 +902,8 @@
             <a:noAutofit/>
           </a:bodyPr>
           <a:p>
-            <a:endParaRPr b="0" lang="en-US" sz="1400" spc="-1" strike="noStrike">
-              <a:solidFill>
-                <a:srgbClr val="000000"/>
-              </a:solidFill>
+            <a:pPr algn="ctr"/>
+            <a:endParaRPr b="0" lang="en-US" sz="4400" spc="-1" strike="noStrike">
               <a:latin typeface="Arial"/>
             </a:endParaRPr>
           </a:p>
@@ -992,7 +933,7 @@
       </p:grpSpPr>
       <p:sp>
         <p:nvSpPr>
-          <p:cNvPr id="59" name="PlaceHolder 1"/>
+          <p:cNvPr id="57" name="PlaceHolder 1"/>
           <p:cNvSpPr>
             <a:spLocks noGrp="1"/>
           </p:cNvSpPr>
@@ -1003,7 +944,7 @@
         <p:spPr>
           <a:xfrm>
             <a:off x="1297440" y="393840"/>
-            <a:ext cx="7038720" cy="4236480"/>
+            <a:ext cx="7038360" cy="4235040"/>
           </a:xfrm>
           <a:prstGeom prst="rect">
             <a:avLst/>
@@ -1045,7 +986,7 @@
       </p:grpSpPr>
       <p:sp>
         <p:nvSpPr>
-          <p:cNvPr id="60" name="PlaceHolder 1"/>
+          <p:cNvPr id="58" name="PlaceHolder 1"/>
           <p:cNvSpPr>
             <a:spLocks noGrp="1"/>
           </p:cNvSpPr>
@@ -1056,7 +997,7 @@
         <p:spPr>
           <a:xfrm>
             <a:off x="1297440" y="393840"/>
-            <a:ext cx="7038720" cy="913680"/>
+            <a:ext cx="7038360" cy="913320"/>
           </a:xfrm>
           <a:prstGeom prst="rect">
             <a:avLst/>
@@ -1067,18 +1008,16 @@
             <a:noAutofit/>
           </a:bodyPr>
           <a:p>
-            <a:endParaRPr b="0" lang="en-US" sz="1400" spc="-1" strike="noStrike">
-              <a:solidFill>
-                <a:srgbClr val="000000"/>
-              </a:solidFill>
-              <a:latin typeface="Arial"/>
-            </a:endParaRPr>
-          </a:p>
-        </p:txBody>
-      </p:sp>
-      <p:sp>
-        <p:nvSpPr>
-          <p:cNvPr id="61" name="PlaceHolder 2"/>
+            <a:pPr algn="ctr"/>
+            <a:endParaRPr b="0" lang="en-US" sz="4400" spc="-1" strike="noStrike">
+              <a:latin typeface="Arial"/>
+            </a:endParaRPr>
+          </a:p>
+        </p:txBody>
+      </p:sp>
+      <p:sp>
+        <p:nvSpPr>
+          <p:cNvPr id="59" name="PlaceHolder 2"/>
           <p:cNvSpPr>
             <a:spLocks noGrp="1"/>
           </p:cNvSpPr>
@@ -1089,7 +1028,7 @@
         <p:spPr>
           <a:xfrm>
             <a:off x="1297440" y="1567440"/>
-            <a:ext cx="3434760" cy="1388160"/>
+            <a:ext cx="3434400" cy="1388160"/>
           </a:xfrm>
           <a:prstGeom prst="rect">
             <a:avLst/>
@@ -1100,18 +1039,15 @@
             <a:normAutofit/>
           </a:bodyPr>
           <a:p>
-            <a:endParaRPr b="0" lang="en-US" sz="1400" spc="-1" strike="noStrike">
-              <a:solidFill>
-                <a:srgbClr val="000000"/>
-              </a:solidFill>
-              <a:latin typeface="Arial"/>
-            </a:endParaRPr>
-          </a:p>
-        </p:txBody>
-      </p:sp>
-      <p:sp>
-        <p:nvSpPr>
-          <p:cNvPr id="62" name="PlaceHolder 3"/>
+            <a:endParaRPr b="0" lang="en-US" sz="3200" spc="-1" strike="noStrike">
+              <a:latin typeface="Arial"/>
+            </a:endParaRPr>
+          </a:p>
+        </p:txBody>
+      </p:sp>
+      <p:sp>
+        <p:nvSpPr>
+          <p:cNvPr id="60" name="PlaceHolder 3"/>
           <p:cNvSpPr>
             <a:spLocks noGrp="1"/>
           </p:cNvSpPr>
@@ -1121,8 +1057,8 @@
         </p:nvSpPr>
         <p:spPr>
           <a:xfrm>
-            <a:off x="4904280" y="1567440"/>
-            <a:ext cx="3434760" cy="2910960"/>
+            <a:off x="4903920" y="1567440"/>
+            <a:ext cx="3434400" cy="2910600"/>
           </a:xfrm>
           <a:prstGeom prst="rect">
             <a:avLst/>
@@ -1133,18 +1069,15 @@
             <a:normAutofit/>
           </a:bodyPr>
           <a:p>
-            <a:endParaRPr b="0" lang="en-US" sz="1400" spc="-1" strike="noStrike">
-              <a:solidFill>
-                <a:srgbClr val="000000"/>
-              </a:solidFill>
-              <a:latin typeface="Arial"/>
-            </a:endParaRPr>
-          </a:p>
-        </p:txBody>
-      </p:sp>
-      <p:sp>
-        <p:nvSpPr>
-          <p:cNvPr id="63" name="PlaceHolder 4"/>
+            <a:endParaRPr b="0" lang="en-US" sz="3200" spc="-1" strike="noStrike">
+              <a:latin typeface="Arial"/>
+            </a:endParaRPr>
+          </a:p>
+        </p:txBody>
+      </p:sp>
+      <p:sp>
+        <p:nvSpPr>
+          <p:cNvPr id="61" name="PlaceHolder 4"/>
           <p:cNvSpPr>
             <a:spLocks noGrp="1"/>
           </p:cNvSpPr>
@@ -1155,7 +1088,7 @@
         <p:spPr>
           <a:xfrm>
             <a:off x="1297440" y="3087720"/>
-            <a:ext cx="3434760" cy="1388160"/>
+            <a:ext cx="3434400" cy="1388160"/>
           </a:xfrm>
           <a:prstGeom prst="rect">
             <a:avLst/>
@@ -1166,10 +1099,7 @@
             <a:normAutofit/>
           </a:bodyPr>
           <a:p>
-            <a:endParaRPr b="0" lang="en-US" sz="1400" spc="-1" strike="noStrike">
-              <a:solidFill>
-                <a:srgbClr val="000000"/>
-              </a:solidFill>
+            <a:endParaRPr b="0" lang="en-US" sz="3200" spc="-1" strike="noStrike">
               <a:latin typeface="Arial"/>
             </a:endParaRPr>
           </a:p>
@@ -1199,7 +1129,7 @@
       </p:grpSpPr>
       <p:sp>
         <p:nvSpPr>
-          <p:cNvPr id="9" name="PlaceHolder 1"/>
+          <p:cNvPr id="8" name="PlaceHolder 1"/>
           <p:cNvSpPr>
             <a:spLocks noGrp="1"/>
           </p:cNvSpPr>
@@ -1210,7 +1140,7 @@
         <p:spPr>
           <a:xfrm>
             <a:off x="1297440" y="393840"/>
-            <a:ext cx="7038720" cy="913680"/>
+            <a:ext cx="7038360" cy="913320"/>
           </a:xfrm>
           <a:prstGeom prst="rect">
             <a:avLst/>
@@ -1221,18 +1151,16 @@
             <a:noAutofit/>
           </a:bodyPr>
           <a:p>
-            <a:endParaRPr b="0" lang="en-US" sz="1400" spc="-1" strike="noStrike">
-              <a:solidFill>
-                <a:srgbClr val="000000"/>
-              </a:solidFill>
-              <a:latin typeface="Arial"/>
-            </a:endParaRPr>
-          </a:p>
-        </p:txBody>
-      </p:sp>
-      <p:sp>
-        <p:nvSpPr>
-          <p:cNvPr id="10" name="PlaceHolder 2"/>
+            <a:pPr algn="ctr"/>
+            <a:endParaRPr b="0" lang="en-US" sz="4400" spc="-1" strike="noStrike">
+              <a:latin typeface="Arial"/>
+            </a:endParaRPr>
+          </a:p>
+        </p:txBody>
+      </p:sp>
+      <p:sp>
+        <p:nvSpPr>
+          <p:cNvPr id="9" name="PlaceHolder 2"/>
           <p:cNvSpPr>
             <a:spLocks noGrp="1"/>
           </p:cNvSpPr>
@@ -1243,7 +1171,7 @@
         <p:spPr>
           <a:xfrm>
             <a:off x="1297440" y="1567440"/>
-            <a:ext cx="7038720" cy="2910960"/>
+            <a:ext cx="7038360" cy="2910600"/>
           </a:xfrm>
           <a:prstGeom prst="rect">
             <a:avLst/>
@@ -1285,7 +1213,7 @@
       </p:grpSpPr>
       <p:sp>
         <p:nvSpPr>
-          <p:cNvPr id="64" name="PlaceHolder 1"/>
+          <p:cNvPr id="62" name="PlaceHolder 1"/>
           <p:cNvSpPr>
             <a:spLocks noGrp="1"/>
           </p:cNvSpPr>
@@ -1296,7 +1224,7 @@
         <p:spPr>
           <a:xfrm>
             <a:off x="1297440" y="393840"/>
-            <a:ext cx="7038720" cy="913680"/>
+            <a:ext cx="7038360" cy="913320"/>
           </a:xfrm>
           <a:prstGeom prst="rect">
             <a:avLst/>
@@ -1307,18 +1235,16 @@
             <a:noAutofit/>
           </a:bodyPr>
           <a:p>
-            <a:endParaRPr b="0" lang="en-US" sz="1400" spc="-1" strike="noStrike">
-              <a:solidFill>
-                <a:srgbClr val="000000"/>
-              </a:solidFill>
-              <a:latin typeface="Arial"/>
-            </a:endParaRPr>
-          </a:p>
-        </p:txBody>
-      </p:sp>
-      <p:sp>
-        <p:nvSpPr>
-          <p:cNvPr id="65" name="PlaceHolder 2"/>
+            <a:pPr algn="ctr"/>
+            <a:endParaRPr b="0" lang="en-US" sz="4400" spc="-1" strike="noStrike">
+              <a:latin typeface="Arial"/>
+            </a:endParaRPr>
+          </a:p>
+        </p:txBody>
+      </p:sp>
+      <p:sp>
+        <p:nvSpPr>
+          <p:cNvPr id="63" name="PlaceHolder 2"/>
           <p:cNvSpPr>
             <a:spLocks noGrp="1"/>
           </p:cNvSpPr>
@@ -1329,7 +1255,7 @@
         <p:spPr>
           <a:xfrm>
             <a:off x="1297440" y="1567440"/>
-            <a:ext cx="3434760" cy="2910960"/>
+            <a:ext cx="3434400" cy="2910600"/>
           </a:xfrm>
           <a:prstGeom prst="rect">
             <a:avLst/>
@@ -1340,18 +1266,15 @@
             <a:normAutofit/>
           </a:bodyPr>
           <a:p>
-            <a:endParaRPr b="0" lang="en-US" sz="1400" spc="-1" strike="noStrike">
-              <a:solidFill>
-                <a:srgbClr val="000000"/>
-              </a:solidFill>
-              <a:latin typeface="Arial"/>
-            </a:endParaRPr>
-          </a:p>
-        </p:txBody>
-      </p:sp>
-      <p:sp>
-        <p:nvSpPr>
-          <p:cNvPr id="66" name="PlaceHolder 3"/>
+            <a:endParaRPr b="0" lang="en-US" sz="3200" spc="-1" strike="noStrike">
+              <a:latin typeface="Arial"/>
+            </a:endParaRPr>
+          </a:p>
+        </p:txBody>
+      </p:sp>
+      <p:sp>
+        <p:nvSpPr>
+          <p:cNvPr id="64" name="PlaceHolder 3"/>
           <p:cNvSpPr>
             <a:spLocks noGrp="1"/>
           </p:cNvSpPr>
@@ -1361,8 +1284,8 @@
         </p:nvSpPr>
         <p:spPr>
           <a:xfrm>
-            <a:off x="4904280" y="1567440"/>
-            <a:ext cx="3434760" cy="1388160"/>
+            <a:off x="4903920" y="1567440"/>
+            <a:ext cx="3434400" cy="1388160"/>
           </a:xfrm>
           <a:prstGeom prst="rect">
             <a:avLst/>
@@ -1373,18 +1296,15 @@
             <a:normAutofit/>
           </a:bodyPr>
           <a:p>
-            <a:endParaRPr b="0" lang="en-US" sz="1400" spc="-1" strike="noStrike">
-              <a:solidFill>
-                <a:srgbClr val="000000"/>
-              </a:solidFill>
-              <a:latin typeface="Arial"/>
-            </a:endParaRPr>
-          </a:p>
-        </p:txBody>
-      </p:sp>
-      <p:sp>
-        <p:nvSpPr>
-          <p:cNvPr id="67" name="PlaceHolder 4"/>
+            <a:endParaRPr b="0" lang="en-US" sz="3200" spc="-1" strike="noStrike">
+              <a:latin typeface="Arial"/>
+            </a:endParaRPr>
+          </a:p>
+        </p:txBody>
+      </p:sp>
+      <p:sp>
+        <p:nvSpPr>
+          <p:cNvPr id="65" name="PlaceHolder 4"/>
           <p:cNvSpPr>
             <a:spLocks noGrp="1"/>
           </p:cNvSpPr>
@@ -1394,8 +1314,8 @@
         </p:nvSpPr>
         <p:spPr>
           <a:xfrm>
-            <a:off x="4904280" y="3087720"/>
-            <a:ext cx="3434760" cy="1388160"/>
+            <a:off x="4903920" y="3087720"/>
+            <a:ext cx="3434400" cy="1388160"/>
           </a:xfrm>
           <a:prstGeom prst="rect">
             <a:avLst/>
@@ -1406,10 +1326,7 @@
             <a:normAutofit/>
           </a:bodyPr>
           <a:p>
-            <a:endParaRPr b="0" lang="en-US" sz="1400" spc="-1" strike="noStrike">
-              <a:solidFill>
-                <a:srgbClr val="000000"/>
-              </a:solidFill>
+            <a:endParaRPr b="0" lang="en-US" sz="3200" spc="-1" strike="noStrike">
               <a:latin typeface="Arial"/>
             </a:endParaRPr>
           </a:p>
@@ -1439,7 +1356,7 @@
       </p:grpSpPr>
       <p:sp>
         <p:nvSpPr>
-          <p:cNvPr id="68" name="PlaceHolder 1"/>
+          <p:cNvPr id="66" name="PlaceHolder 1"/>
           <p:cNvSpPr>
             <a:spLocks noGrp="1"/>
           </p:cNvSpPr>
@@ -1450,7 +1367,7 @@
         <p:spPr>
           <a:xfrm>
             <a:off x="1297440" y="393840"/>
-            <a:ext cx="7038720" cy="913680"/>
+            <a:ext cx="7038360" cy="913320"/>
           </a:xfrm>
           <a:prstGeom prst="rect">
             <a:avLst/>
@@ -1461,18 +1378,16 @@
             <a:noAutofit/>
           </a:bodyPr>
           <a:p>
-            <a:endParaRPr b="0" lang="en-US" sz="1400" spc="-1" strike="noStrike">
-              <a:solidFill>
-                <a:srgbClr val="000000"/>
-              </a:solidFill>
-              <a:latin typeface="Arial"/>
-            </a:endParaRPr>
-          </a:p>
-        </p:txBody>
-      </p:sp>
-      <p:sp>
-        <p:nvSpPr>
-          <p:cNvPr id="69" name="PlaceHolder 2"/>
+            <a:pPr algn="ctr"/>
+            <a:endParaRPr b="0" lang="en-US" sz="4400" spc="-1" strike="noStrike">
+              <a:latin typeface="Arial"/>
+            </a:endParaRPr>
+          </a:p>
+        </p:txBody>
+      </p:sp>
+      <p:sp>
+        <p:nvSpPr>
+          <p:cNvPr id="67" name="PlaceHolder 2"/>
           <p:cNvSpPr>
             <a:spLocks noGrp="1"/>
           </p:cNvSpPr>
@@ -1483,7 +1398,7 @@
         <p:spPr>
           <a:xfrm>
             <a:off x="1297440" y="1567440"/>
-            <a:ext cx="3434760" cy="1388160"/>
+            <a:ext cx="3434400" cy="1388160"/>
           </a:xfrm>
           <a:prstGeom prst="rect">
             <a:avLst/>
@@ -1494,18 +1409,15 @@
             <a:normAutofit/>
           </a:bodyPr>
           <a:p>
-            <a:endParaRPr b="0" lang="en-US" sz="1400" spc="-1" strike="noStrike">
-              <a:solidFill>
-                <a:srgbClr val="000000"/>
-              </a:solidFill>
-              <a:latin typeface="Arial"/>
-            </a:endParaRPr>
-          </a:p>
-        </p:txBody>
-      </p:sp>
-      <p:sp>
-        <p:nvSpPr>
-          <p:cNvPr id="70" name="PlaceHolder 3"/>
+            <a:endParaRPr b="0" lang="en-US" sz="3200" spc="-1" strike="noStrike">
+              <a:latin typeface="Arial"/>
+            </a:endParaRPr>
+          </a:p>
+        </p:txBody>
+      </p:sp>
+      <p:sp>
+        <p:nvSpPr>
+          <p:cNvPr id="68" name="PlaceHolder 3"/>
           <p:cNvSpPr>
             <a:spLocks noGrp="1"/>
           </p:cNvSpPr>
@@ -1515,8 +1427,8 @@
         </p:nvSpPr>
         <p:spPr>
           <a:xfrm>
-            <a:off x="4904280" y="1567440"/>
-            <a:ext cx="3434760" cy="1388160"/>
+            <a:off x="4903920" y="1567440"/>
+            <a:ext cx="3434400" cy="1388160"/>
           </a:xfrm>
           <a:prstGeom prst="rect">
             <a:avLst/>
@@ -1527,18 +1439,15 @@
             <a:normAutofit/>
           </a:bodyPr>
           <a:p>
-            <a:endParaRPr b="0" lang="en-US" sz="1400" spc="-1" strike="noStrike">
-              <a:solidFill>
-                <a:srgbClr val="000000"/>
-              </a:solidFill>
-              <a:latin typeface="Arial"/>
-            </a:endParaRPr>
-          </a:p>
-        </p:txBody>
-      </p:sp>
-      <p:sp>
-        <p:nvSpPr>
-          <p:cNvPr id="71" name="PlaceHolder 4"/>
+            <a:endParaRPr b="0" lang="en-US" sz="3200" spc="-1" strike="noStrike">
+              <a:latin typeface="Arial"/>
+            </a:endParaRPr>
+          </a:p>
+        </p:txBody>
+      </p:sp>
+      <p:sp>
+        <p:nvSpPr>
+          <p:cNvPr id="69" name="PlaceHolder 4"/>
           <p:cNvSpPr>
             <a:spLocks noGrp="1"/>
           </p:cNvSpPr>
@@ -1549,7 +1458,7 @@
         <p:spPr>
           <a:xfrm>
             <a:off x="1297440" y="3087720"/>
-            <a:ext cx="7038720" cy="1388160"/>
+            <a:ext cx="7038360" cy="1388160"/>
           </a:xfrm>
           <a:prstGeom prst="rect">
             <a:avLst/>
@@ -1560,10 +1469,7 @@
             <a:normAutofit/>
           </a:bodyPr>
           <a:p>
-            <a:endParaRPr b="0" lang="en-US" sz="1400" spc="-1" strike="noStrike">
-              <a:solidFill>
-                <a:srgbClr val="000000"/>
-              </a:solidFill>
+            <a:endParaRPr b="0" lang="en-US" sz="3200" spc="-1" strike="noStrike">
               <a:latin typeface="Arial"/>
             </a:endParaRPr>
           </a:p>
@@ -1593,7 +1499,7 @@
       </p:grpSpPr>
       <p:sp>
         <p:nvSpPr>
-          <p:cNvPr id="72" name="PlaceHolder 1"/>
+          <p:cNvPr id="70" name="PlaceHolder 1"/>
           <p:cNvSpPr>
             <a:spLocks noGrp="1"/>
           </p:cNvSpPr>
@@ -1604,7 +1510,7 @@
         <p:spPr>
           <a:xfrm>
             <a:off x="1297440" y="393840"/>
-            <a:ext cx="7038720" cy="913680"/>
+            <a:ext cx="7038360" cy="913320"/>
           </a:xfrm>
           <a:prstGeom prst="rect">
             <a:avLst/>
@@ -1615,18 +1521,16 @@
             <a:noAutofit/>
           </a:bodyPr>
           <a:p>
-            <a:endParaRPr b="0" lang="en-US" sz="1400" spc="-1" strike="noStrike">
-              <a:solidFill>
-                <a:srgbClr val="000000"/>
-              </a:solidFill>
-              <a:latin typeface="Arial"/>
-            </a:endParaRPr>
-          </a:p>
-        </p:txBody>
-      </p:sp>
-      <p:sp>
-        <p:nvSpPr>
-          <p:cNvPr id="73" name="PlaceHolder 2"/>
+            <a:pPr algn="ctr"/>
+            <a:endParaRPr b="0" lang="en-US" sz="4400" spc="-1" strike="noStrike">
+              <a:latin typeface="Arial"/>
+            </a:endParaRPr>
+          </a:p>
+        </p:txBody>
+      </p:sp>
+      <p:sp>
+        <p:nvSpPr>
+          <p:cNvPr id="71" name="PlaceHolder 2"/>
           <p:cNvSpPr>
             <a:spLocks noGrp="1"/>
           </p:cNvSpPr>
@@ -1637,7 +1541,7 @@
         <p:spPr>
           <a:xfrm>
             <a:off x="1297440" y="1567440"/>
-            <a:ext cx="7038720" cy="1388160"/>
+            <a:ext cx="7038360" cy="1388160"/>
           </a:xfrm>
           <a:prstGeom prst="rect">
             <a:avLst/>
@@ -1648,18 +1552,15 @@
             <a:normAutofit/>
           </a:bodyPr>
           <a:p>
-            <a:endParaRPr b="0" lang="en-US" sz="1400" spc="-1" strike="noStrike">
-              <a:solidFill>
-                <a:srgbClr val="000000"/>
-              </a:solidFill>
-              <a:latin typeface="Arial"/>
-            </a:endParaRPr>
-          </a:p>
-        </p:txBody>
-      </p:sp>
-      <p:sp>
-        <p:nvSpPr>
-          <p:cNvPr id="74" name="PlaceHolder 3"/>
+            <a:endParaRPr b="0" lang="en-US" sz="3200" spc="-1" strike="noStrike">
+              <a:latin typeface="Arial"/>
+            </a:endParaRPr>
+          </a:p>
+        </p:txBody>
+      </p:sp>
+      <p:sp>
+        <p:nvSpPr>
+          <p:cNvPr id="72" name="PlaceHolder 3"/>
           <p:cNvSpPr>
             <a:spLocks noGrp="1"/>
           </p:cNvSpPr>
@@ -1670,7 +1571,7 @@
         <p:spPr>
           <a:xfrm>
             <a:off x="1297440" y="3087720"/>
-            <a:ext cx="7038720" cy="1388160"/>
+            <a:ext cx="7038360" cy="1388160"/>
           </a:xfrm>
           <a:prstGeom prst="rect">
             <a:avLst/>
@@ -1681,10 +1582,7 @@
             <a:normAutofit/>
           </a:bodyPr>
           <a:p>
-            <a:endParaRPr b="0" lang="en-US" sz="1400" spc="-1" strike="noStrike">
-              <a:solidFill>
-                <a:srgbClr val="000000"/>
-              </a:solidFill>
+            <a:endParaRPr b="0" lang="en-US" sz="3200" spc="-1" strike="noStrike">
               <a:latin typeface="Arial"/>
             </a:endParaRPr>
           </a:p>
@@ -1714,7 +1612,7 @@
       </p:grpSpPr>
       <p:sp>
         <p:nvSpPr>
-          <p:cNvPr id="75" name="PlaceHolder 1"/>
+          <p:cNvPr id="73" name="PlaceHolder 1"/>
           <p:cNvSpPr>
             <a:spLocks noGrp="1"/>
           </p:cNvSpPr>
@@ -1725,7 +1623,7 @@
         <p:spPr>
           <a:xfrm>
             <a:off x="1297440" y="393840"/>
-            <a:ext cx="7038720" cy="913680"/>
+            <a:ext cx="7038360" cy="913320"/>
           </a:xfrm>
           <a:prstGeom prst="rect">
             <a:avLst/>
@@ -1736,18 +1634,16 @@
             <a:noAutofit/>
           </a:bodyPr>
           <a:p>
-            <a:endParaRPr b="0" lang="en-US" sz="1400" spc="-1" strike="noStrike">
-              <a:solidFill>
-                <a:srgbClr val="000000"/>
-              </a:solidFill>
-              <a:latin typeface="Arial"/>
-            </a:endParaRPr>
-          </a:p>
-        </p:txBody>
-      </p:sp>
-      <p:sp>
-        <p:nvSpPr>
-          <p:cNvPr id="76" name="PlaceHolder 2"/>
+            <a:pPr algn="ctr"/>
+            <a:endParaRPr b="0" lang="en-US" sz="4400" spc="-1" strike="noStrike">
+              <a:latin typeface="Arial"/>
+            </a:endParaRPr>
+          </a:p>
+        </p:txBody>
+      </p:sp>
+      <p:sp>
+        <p:nvSpPr>
+          <p:cNvPr id="74" name="PlaceHolder 2"/>
           <p:cNvSpPr>
             <a:spLocks noGrp="1"/>
           </p:cNvSpPr>
@@ -1758,7 +1654,7 @@
         <p:spPr>
           <a:xfrm>
             <a:off x="1297440" y="1567440"/>
-            <a:ext cx="3434760" cy="1388160"/>
+            <a:ext cx="3434400" cy="1388160"/>
           </a:xfrm>
           <a:prstGeom prst="rect">
             <a:avLst/>
@@ -1769,18 +1665,15 @@
             <a:normAutofit/>
           </a:bodyPr>
           <a:p>
-            <a:endParaRPr b="0" lang="en-US" sz="1400" spc="-1" strike="noStrike">
-              <a:solidFill>
-                <a:srgbClr val="000000"/>
-              </a:solidFill>
-              <a:latin typeface="Arial"/>
-            </a:endParaRPr>
-          </a:p>
-        </p:txBody>
-      </p:sp>
-      <p:sp>
-        <p:nvSpPr>
-          <p:cNvPr id="77" name="PlaceHolder 3"/>
+            <a:endParaRPr b="0" lang="en-US" sz="3200" spc="-1" strike="noStrike">
+              <a:latin typeface="Arial"/>
+            </a:endParaRPr>
+          </a:p>
+        </p:txBody>
+      </p:sp>
+      <p:sp>
+        <p:nvSpPr>
+          <p:cNvPr id="75" name="PlaceHolder 3"/>
           <p:cNvSpPr>
             <a:spLocks noGrp="1"/>
           </p:cNvSpPr>
@@ -1790,8 +1683,8 @@
         </p:nvSpPr>
         <p:spPr>
           <a:xfrm>
-            <a:off x="4904280" y="1567440"/>
-            <a:ext cx="3434760" cy="1388160"/>
+            <a:off x="4903920" y="1567440"/>
+            <a:ext cx="3434400" cy="1388160"/>
           </a:xfrm>
           <a:prstGeom prst="rect">
             <a:avLst/>
@@ -1802,18 +1695,15 @@
             <a:normAutofit/>
           </a:bodyPr>
           <a:p>
-            <a:endParaRPr b="0" lang="en-US" sz="1400" spc="-1" strike="noStrike">
-              <a:solidFill>
-                <a:srgbClr val="000000"/>
-              </a:solidFill>
-              <a:latin typeface="Arial"/>
-            </a:endParaRPr>
-          </a:p>
-        </p:txBody>
-      </p:sp>
-      <p:sp>
-        <p:nvSpPr>
-          <p:cNvPr id="78" name="PlaceHolder 4"/>
+            <a:endParaRPr b="0" lang="en-US" sz="3200" spc="-1" strike="noStrike">
+              <a:latin typeface="Arial"/>
+            </a:endParaRPr>
+          </a:p>
+        </p:txBody>
+      </p:sp>
+      <p:sp>
+        <p:nvSpPr>
+          <p:cNvPr id="76" name="PlaceHolder 4"/>
           <p:cNvSpPr>
             <a:spLocks noGrp="1"/>
           </p:cNvSpPr>
@@ -1824,7 +1714,7 @@
         <p:spPr>
           <a:xfrm>
             <a:off x="1297440" y="3087720"/>
-            <a:ext cx="3434760" cy="1388160"/>
+            <a:ext cx="3434400" cy="1388160"/>
           </a:xfrm>
           <a:prstGeom prst="rect">
             <a:avLst/>
@@ -1835,18 +1725,15 @@
             <a:normAutofit/>
           </a:bodyPr>
           <a:p>
-            <a:endParaRPr b="0" lang="en-US" sz="1400" spc="-1" strike="noStrike">
-              <a:solidFill>
-                <a:srgbClr val="000000"/>
-              </a:solidFill>
-              <a:latin typeface="Arial"/>
-            </a:endParaRPr>
-          </a:p>
-        </p:txBody>
-      </p:sp>
-      <p:sp>
-        <p:nvSpPr>
-          <p:cNvPr id="79" name="PlaceHolder 5"/>
+            <a:endParaRPr b="0" lang="en-US" sz="3200" spc="-1" strike="noStrike">
+              <a:latin typeface="Arial"/>
+            </a:endParaRPr>
+          </a:p>
+        </p:txBody>
+      </p:sp>
+      <p:sp>
+        <p:nvSpPr>
+          <p:cNvPr id="77" name="PlaceHolder 5"/>
           <p:cNvSpPr>
             <a:spLocks noGrp="1"/>
           </p:cNvSpPr>
@@ -1856,8 +1743,8 @@
         </p:nvSpPr>
         <p:spPr>
           <a:xfrm>
-            <a:off x="4904280" y="3087720"/>
-            <a:ext cx="3434760" cy="1388160"/>
+            <a:off x="4903920" y="3087720"/>
+            <a:ext cx="3434400" cy="1388160"/>
           </a:xfrm>
           <a:prstGeom prst="rect">
             <a:avLst/>
@@ -1868,10 +1755,7 @@
             <a:normAutofit/>
           </a:bodyPr>
           <a:p>
-            <a:endParaRPr b="0" lang="en-US" sz="1400" spc="-1" strike="noStrike">
-              <a:solidFill>
-                <a:srgbClr val="000000"/>
-              </a:solidFill>
+            <a:endParaRPr b="0" lang="en-US" sz="3200" spc="-1" strike="noStrike">
               <a:latin typeface="Arial"/>
             </a:endParaRPr>
           </a:p>
@@ -1901,7 +1785,7 @@
       </p:grpSpPr>
       <p:sp>
         <p:nvSpPr>
-          <p:cNvPr id="80" name="PlaceHolder 1"/>
+          <p:cNvPr id="78" name="PlaceHolder 1"/>
           <p:cNvSpPr>
             <a:spLocks noGrp="1"/>
           </p:cNvSpPr>
@@ -1912,7 +1796,7 @@
         <p:spPr>
           <a:xfrm>
             <a:off x="1297440" y="393840"/>
-            <a:ext cx="7038720" cy="913680"/>
+            <a:ext cx="7038360" cy="913320"/>
           </a:xfrm>
           <a:prstGeom prst="rect">
             <a:avLst/>
@@ -1923,18 +1807,16 @@
             <a:noAutofit/>
           </a:bodyPr>
           <a:p>
-            <a:endParaRPr b="0" lang="en-US" sz="1400" spc="-1" strike="noStrike">
-              <a:solidFill>
-                <a:srgbClr val="000000"/>
-              </a:solidFill>
-              <a:latin typeface="Arial"/>
-            </a:endParaRPr>
-          </a:p>
-        </p:txBody>
-      </p:sp>
-      <p:sp>
-        <p:nvSpPr>
-          <p:cNvPr id="81" name="PlaceHolder 2"/>
+            <a:pPr algn="ctr"/>
+            <a:endParaRPr b="0" lang="en-US" sz="4400" spc="-1" strike="noStrike">
+              <a:latin typeface="Arial"/>
+            </a:endParaRPr>
+          </a:p>
+        </p:txBody>
+      </p:sp>
+      <p:sp>
+        <p:nvSpPr>
+          <p:cNvPr id="79" name="PlaceHolder 2"/>
           <p:cNvSpPr>
             <a:spLocks noGrp="1"/>
           </p:cNvSpPr>
@@ -1956,18 +1838,15 @@
             <a:normAutofit/>
           </a:bodyPr>
           <a:p>
-            <a:endParaRPr b="0" lang="en-US" sz="1400" spc="-1" strike="noStrike">
-              <a:solidFill>
-                <a:srgbClr val="000000"/>
-              </a:solidFill>
-              <a:latin typeface="Arial"/>
-            </a:endParaRPr>
-          </a:p>
-        </p:txBody>
-      </p:sp>
-      <p:sp>
-        <p:nvSpPr>
-          <p:cNvPr id="82" name="PlaceHolder 3"/>
+            <a:endParaRPr b="0" lang="en-US" sz="3200" spc="-1" strike="noStrike">
+              <a:latin typeface="Arial"/>
+            </a:endParaRPr>
+          </a:p>
+        </p:txBody>
+      </p:sp>
+      <p:sp>
+        <p:nvSpPr>
+          <p:cNvPr id="80" name="PlaceHolder 3"/>
           <p:cNvSpPr>
             <a:spLocks noGrp="1"/>
           </p:cNvSpPr>
@@ -1989,18 +1868,15 @@
             <a:normAutofit/>
           </a:bodyPr>
           <a:p>
-            <a:endParaRPr b="0" lang="en-US" sz="1400" spc="-1" strike="noStrike">
-              <a:solidFill>
-                <a:srgbClr val="000000"/>
-              </a:solidFill>
-              <a:latin typeface="Arial"/>
-            </a:endParaRPr>
-          </a:p>
-        </p:txBody>
-      </p:sp>
-      <p:sp>
-        <p:nvSpPr>
-          <p:cNvPr id="83" name="PlaceHolder 4"/>
+            <a:endParaRPr b="0" lang="en-US" sz="3200" spc="-1" strike="noStrike">
+              <a:latin typeface="Arial"/>
+            </a:endParaRPr>
+          </a:p>
+        </p:txBody>
+      </p:sp>
+      <p:sp>
+        <p:nvSpPr>
+          <p:cNvPr id="81" name="PlaceHolder 4"/>
           <p:cNvSpPr>
             <a:spLocks noGrp="1"/>
           </p:cNvSpPr>
@@ -2022,18 +1898,15 @@
             <a:normAutofit/>
           </a:bodyPr>
           <a:p>
-            <a:endParaRPr b="0" lang="en-US" sz="1400" spc="-1" strike="noStrike">
-              <a:solidFill>
-                <a:srgbClr val="000000"/>
-              </a:solidFill>
-              <a:latin typeface="Arial"/>
-            </a:endParaRPr>
-          </a:p>
-        </p:txBody>
-      </p:sp>
-      <p:sp>
-        <p:nvSpPr>
-          <p:cNvPr id="84" name="PlaceHolder 5"/>
+            <a:endParaRPr b="0" lang="en-US" sz="3200" spc="-1" strike="noStrike">
+              <a:latin typeface="Arial"/>
+            </a:endParaRPr>
+          </a:p>
+        </p:txBody>
+      </p:sp>
+      <p:sp>
+        <p:nvSpPr>
+          <p:cNvPr id="82" name="PlaceHolder 5"/>
           <p:cNvSpPr>
             <a:spLocks noGrp="1"/>
           </p:cNvSpPr>
@@ -2055,18 +1928,15 @@
             <a:normAutofit/>
           </a:bodyPr>
           <a:p>
-            <a:endParaRPr b="0" lang="en-US" sz="1400" spc="-1" strike="noStrike">
-              <a:solidFill>
-                <a:srgbClr val="000000"/>
-              </a:solidFill>
-              <a:latin typeface="Arial"/>
-            </a:endParaRPr>
-          </a:p>
-        </p:txBody>
-      </p:sp>
-      <p:sp>
-        <p:nvSpPr>
-          <p:cNvPr id="85" name="PlaceHolder 6"/>
+            <a:endParaRPr b="0" lang="en-US" sz="3200" spc="-1" strike="noStrike">
+              <a:latin typeface="Arial"/>
+            </a:endParaRPr>
+          </a:p>
+        </p:txBody>
+      </p:sp>
+      <p:sp>
+        <p:nvSpPr>
+          <p:cNvPr id="83" name="PlaceHolder 6"/>
           <p:cNvSpPr>
             <a:spLocks noGrp="1"/>
           </p:cNvSpPr>
@@ -2088,18 +1958,15 @@
             <a:normAutofit/>
           </a:bodyPr>
           <a:p>
-            <a:endParaRPr b="0" lang="en-US" sz="1400" spc="-1" strike="noStrike">
-              <a:solidFill>
-                <a:srgbClr val="000000"/>
-              </a:solidFill>
-              <a:latin typeface="Arial"/>
-            </a:endParaRPr>
-          </a:p>
-        </p:txBody>
-      </p:sp>
-      <p:sp>
-        <p:nvSpPr>
-          <p:cNvPr id="86" name="PlaceHolder 7"/>
+            <a:endParaRPr b="0" lang="en-US" sz="3200" spc="-1" strike="noStrike">
+              <a:latin typeface="Arial"/>
+            </a:endParaRPr>
+          </a:p>
+        </p:txBody>
+      </p:sp>
+      <p:sp>
+        <p:nvSpPr>
+          <p:cNvPr id="84" name="PlaceHolder 7"/>
           <p:cNvSpPr>
             <a:spLocks noGrp="1"/>
           </p:cNvSpPr>
@@ -2121,10 +1988,7 @@
             <a:normAutofit/>
           </a:bodyPr>
           <a:p>
-            <a:endParaRPr b="0" lang="en-US" sz="1400" spc="-1" strike="noStrike">
-              <a:solidFill>
-                <a:srgbClr val="000000"/>
-              </a:solidFill>
+            <a:endParaRPr b="0" lang="en-US" sz="3200" spc="-1" strike="noStrike">
               <a:latin typeface="Arial"/>
             </a:endParaRPr>
           </a:p>
@@ -2154,7 +2018,7 @@
       </p:grpSpPr>
       <p:sp>
         <p:nvSpPr>
-          <p:cNvPr id="11" name="PlaceHolder 1"/>
+          <p:cNvPr id="10" name="PlaceHolder 1"/>
           <p:cNvSpPr>
             <a:spLocks noGrp="1"/>
           </p:cNvSpPr>
@@ -2165,7 +2029,7 @@
         <p:spPr>
           <a:xfrm>
             <a:off x="1297440" y="393840"/>
-            <a:ext cx="7038720" cy="913680"/>
+            <a:ext cx="7038360" cy="913320"/>
           </a:xfrm>
           <a:prstGeom prst="rect">
             <a:avLst/>
@@ -2176,18 +2040,16 @@
             <a:noAutofit/>
           </a:bodyPr>
           <a:p>
-            <a:endParaRPr b="0" lang="en-US" sz="1400" spc="-1" strike="noStrike">
-              <a:solidFill>
-                <a:srgbClr val="000000"/>
-              </a:solidFill>
-              <a:latin typeface="Arial"/>
-            </a:endParaRPr>
-          </a:p>
-        </p:txBody>
-      </p:sp>
-      <p:sp>
-        <p:nvSpPr>
-          <p:cNvPr id="12" name="PlaceHolder 2"/>
+            <a:pPr algn="ctr"/>
+            <a:endParaRPr b="0" lang="en-US" sz="4400" spc="-1" strike="noStrike">
+              <a:latin typeface="Arial"/>
+            </a:endParaRPr>
+          </a:p>
+        </p:txBody>
+      </p:sp>
+      <p:sp>
+        <p:nvSpPr>
+          <p:cNvPr id="11" name="PlaceHolder 2"/>
           <p:cNvSpPr>
             <a:spLocks noGrp="1"/>
           </p:cNvSpPr>
@@ -2198,7 +2060,7 @@
         <p:spPr>
           <a:xfrm>
             <a:off x="1297440" y="1567440"/>
-            <a:ext cx="7038720" cy="2910960"/>
+            <a:ext cx="7038360" cy="2910600"/>
           </a:xfrm>
           <a:prstGeom prst="rect">
             <a:avLst/>
@@ -2209,10 +2071,7 @@
             <a:normAutofit/>
           </a:bodyPr>
           <a:p>
-            <a:endParaRPr b="0" lang="en-US" sz="1400" spc="-1" strike="noStrike">
-              <a:solidFill>
-                <a:srgbClr val="000000"/>
-              </a:solidFill>
+            <a:endParaRPr b="0" lang="en-US" sz="3200" spc="-1" strike="noStrike">
               <a:latin typeface="Arial"/>
             </a:endParaRPr>
           </a:p>
@@ -2242,7 +2101,7 @@
       </p:grpSpPr>
       <p:sp>
         <p:nvSpPr>
-          <p:cNvPr id="13" name="PlaceHolder 1"/>
+          <p:cNvPr id="12" name="PlaceHolder 1"/>
           <p:cNvSpPr>
             <a:spLocks noGrp="1"/>
           </p:cNvSpPr>
@@ -2253,7 +2112,7 @@
         <p:spPr>
           <a:xfrm>
             <a:off x="1297440" y="393840"/>
-            <a:ext cx="7038720" cy="913680"/>
+            <a:ext cx="7038360" cy="913320"/>
           </a:xfrm>
           <a:prstGeom prst="rect">
             <a:avLst/>
@@ -2264,18 +2123,16 @@
             <a:noAutofit/>
           </a:bodyPr>
           <a:p>
-            <a:endParaRPr b="0" lang="en-US" sz="1400" spc="-1" strike="noStrike">
-              <a:solidFill>
-                <a:srgbClr val="000000"/>
-              </a:solidFill>
-              <a:latin typeface="Arial"/>
-            </a:endParaRPr>
-          </a:p>
-        </p:txBody>
-      </p:sp>
-      <p:sp>
-        <p:nvSpPr>
-          <p:cNvPr id="14" name="PlaceHolder 2"/>
+            <a:pPr algn="ctr"/>
+            <a:endParaRPr b="0" lang="en-US" sz="4400" spc="-1" strike="noStrike">
+              <a:latin typeface="Arial"/>
+            </a:endParaRPr>
+          </a:p>
+        </p:txBody>
+      </p:sp>
+      <p:sp>
+        <p:nvSpPr>
+          <p:cNvPr id="13" name="PlaceHolder 2"/>
           <p:cNvSpPr>
             <a:spLocks noGrp="1"/>
           </p:cNvSpPr>
@@ -2286,7 +2143,7 @@
         <p:spPr>
           <a:xfrm>
             <a:off x="1297440" y="1567440"/>
-            <a:ext cx="3434760" cy="2910960"/>
+            <a:ext cx="3434400" cy="2910600"/>
           </a:xfrm>
           <a:prstGeom prst="rect">
             <a:avLst/>
@@ -2297,18 +2154,15 @@
             <a:normAutofit/>
           </a:bodyPr>
           <a:p>
-            <a:endParaRPr b="0" lang="en-US" sz="1400" spc="-1" strike="noStrike">
-              <a:solidFill>
-                <a:srgbClr val="000000"/>
-              </a:solidFill>
-              <a:latin typeface="Arial"/>
-            </a:endParaRPr>
-          </a:p>
-        </p:txBody>
-      </p:sp>
-      <p:sp>
-        <p:nvSpPr>
-          <p:cNvPr id="15" name="PlaceHolder 3"/>
+            <a:endParaRPr b="0" lang="en-US" sz="3200" spc="-1" strike="noStrike">
+              <a:latin typeface="Arial"/>
+            </a:endParaRPr>
+          </a:p>
+        </p:txBody>
+      </p:sp>
+      <p:sp>
+        <p:nvSpPr>
+          <p:cNvPr id="14" name="PlaceHolder 3"/>
           <p:cNvSpPr>
             <a:spLocks noGrp="1"/>
           </p:cNvSpPr>
@@ -2318,8 +2172,8 @@
         </p:nvSpPr>
         <p:spPr>
           <a:xfrm>
-            <a:off x="4904280" y="1567440"/>
-            <a:ext cx="3434760" cy="2910960"/>
+            <a:off x="4903920" y="1567440"/>
+            <a:ext cx="3434400" cy="2910600"/>
           </a:xfrm>
           <a:prstGeom prst="rect">
             <a:avLst/>
@@ -2330,10 +2184,7 @@
             <a:normAutofit/>
           </a:bodyPr>
           <a:p>
-            <a:endParaRPr b="0" lang="en-US" sz="1400" spc="-1" strike="noStrike">
-              <a:solidFill>
-                <a:srgbClr val="000000"/>
-              </a:solidFill>
+            <a:endParaRPr b="0" lang="en-US" sz="3200" spc="-1" strike="noStrike">
               <a:latin typeface="Arial"/>
             </a:endParaRPr>
           </a:p>
@@ -2363,7 +2214,7 @@
       </p:grpSpPr>
       <p:sp>
         <p:nvSpPr>
-          <p:cNvPr id="16" name="PlaceHolder 1"/>
+          <p:cNvPr id="15" name="PlaceHolder 1"/>
           <p:cNvSpPr>
             <a:spLocks noGrp="1"/>
           </p:cNvSpPr>
@@ -2374,7 +2225,7 @@
         <p:spPr>
           <a:xfrm>
             <a:off x="1297440" y="393840"/>
-            <a:ext cx="7038720" cy="913680"/>
+            <a:ext cx="7038360" cy="913320"/>
           </a:xfrm>
           <a:prstGeom prst="rect">
             <a:avLst/>
@@ -2385,10 +2236,8 @@
             <a:noAutofit/>
           </a:bodyPr>
           <a:p>
-            <a:endParaRPr b="0" lang="en-US" sz="1400" spc="-1" strike="noStrike">
-              <a:solidFill>
-                <a:srgbClr val="000000"/>
-              </a:solidFill>
+            <a:pPr algn="ctr"/>
+            <a:endParaRPr b="0" lang="en-US" sz="4400" spc="-1" strike="noStrike">
               <a:latin typeface="Arial"/>
             </a:endParaRPr>
           </a:p>
@@ -2418,7 +2267,7 @@
       </p:grpSpPr>
       <p:sp>
         <p:nvSpPr>
-          <p:cNvPr id="17" name="PlaceHolder 1"/>
+          <p:cNvPr id="16" name="PlaceHolder 1"/>
           <p:cNvSpPr>
             <a:spLocks noGrp="1"/>
           </p:cNvSpPr>
@@ -2429,7 +2278,7 @@
         <p:spPr>
           <a:xfrm>
             <a:off x="1297440" y="393840"/>
-            <a:ext cx="7038720" cy="4236480"/>
+            <a:ext cx="7038360" cy="4235040"/>
           </a:xfrm>
           <a:prstGeom prst="rect">
             <a:avLst/>
@@ -2471,7 +2320,7 @@
       </p:grpSpPr>
       <p:sp>
         <p:nvSpPr>
-          <p:cNvPr id="18" name="PlaceHolder 1"/>
+          <p:cNvPr id="17" name="PlaceHolder 1"/>
           <p:cNvSpPr>
             <a:spLocks noGrp="1"/>
           </p:cNvSpPr>
@@ -2482,7 +2331,7 @@
         <p:spPr>
           <a:xfrm>
             <a:off x="1297440" y="393840"/>
-            <a:ext cx="7038720" cy="913680"/>
+            <a:ext cx="7038360" cy="913320"/>
           </a:xfrm>
           <a:prstGeom prst="rect">
             <a:avLst/>
@@ -2493,18 +2342,16 @@
             <a:noAutofit/>
           </a:bodyPr>
           <a:p>
-            <a:endParaRPr b="0" lang="en-US" sz="1400" spc="-1" strike="noStrike">
-              <a:solidFill>
-                <a:srgbClr val="000000"/>
-              </a:solidFill>
-              <a:latin typeface="Arial"/>
-            </a:endParaRPr>
-          </a:p>
-        </p:txBody>
-      </p:sp>
-      <p:sp>
-        <p:nvSpPr>
-          <p:cNvPr id="19" name="PlaceHolder 2"/>
+            <a:pPr algn="ctr"/>
+            <a:endParaRPr b="0" lang="en-US" sz="4400" spc="-1" strike="noStrike">
+              <a:latin typeface="Arial"/>
+            </a:endParaRPr>
+          </a:p>
+        </p:txBody>
+      </p:sp>
+      <p:sp>
+        <p:nvSpPr>
+          <p:cNvPr id="18" name="PlaceHolder 2"/>
           <p:cNvSpPr>
             <a:spLocks noGrp="1"/>
           </p:cNvSpPr>
@@ -2515,7 +2362,7 @@
         <p:spPr>
           <a:xfrm>
             <a:off x="1297440" y="1567440"/>
-            <a:ext cx="3434760" cy="1388160"/>
+            <a:ext cx="3434400" cy="1388160"/>
           </a:xfrm>
           <a:prstGeom prst="rect">
             <a:avLst/>
@@ -2526,18 +2373,15 @@
             <a:normAutofit/>
           </a:bodyPr>
           <a:p>
-            <a:endParaRPr b="0" lang="en-US" sz="1400" spc="-1" strike="noStrike">
-              <a:solidFill>
-                <a:srgbClr val="000000"/>
-              </a:solidFill>
-              <a:latin typeface="Arial"/>
-            </a:endParaRPr>
-          </a:p>
-        </p:txBody>
-      </p:sp>
-      <p:sp>
-        <p:nvSpPr>
-          <p:cNvPr id="20" name="PlaceHolder 3"/>
+            <a:endParaRPr b="0" lang="en-US" sz="3200" spc="-1" strike="noStrike">
+              <a:latin typeface="Arial"/>
+            </a:endParaRPr>
+          </a:p>
+        </p:txBody>
+      </p:sp>
+      <p:sp>
+        <p:nvSpPr>
+          <p:cNvPr id="19" name="PlaceHolder 3"/>
           <p:cNvSpPr>
             <a:spLocks noGrp="1"/>
           </p:cNvSpPr>
@@ -2547,8 +2391,8 @@
         </p:nvSpPr>
         <p:spPr>
           <a:xfrm>
-            <a:off x="4904280" y="1567440"/>
-            <a:ext cx="3434760" cy="2910960"/>
+            <a:off x="4903920" y="1567440"/>
+            <a:ext cx="3434400" cy="2910600"/>
           </a:xfrm>
           <a:prstGeom prst="rect">
             <a:avLst/>
@@ -2559,18 +2403,15 @@
             <a:normAutofit/>
           </a:bodyPr>
           <a:p>
-            <a:endParaRPr b="0" lang="en-US" sz="1400" spc="-1" strike="noStrike">
-              <a:solidFill>
-                <a:srgbClr val="000000"/>
-              </a:solidFill>
-              <a:latin typeface="Arial"/>
-            </a:endParaRPr>
-          </a:p>
-        </p:txBody>
-      </p:sp>
-      <p:sp>
-        <p:nvSpPr>
-          <p:cNvPr id="21" name="PlaceHolder 4"/>
+            <a:endParaRPr b="0" lang="en-US" sz="3200" spc="-1" strike="noStrike">
+              <a:latin typeface="Arial"/>
+            </a:endParaRPr>
+          </a:p>
+        </p:txBody>
+      </p:sp>
+      <p:sp>
+        <p:nvSpPr>
+          <p:cNvPr id="20" name="PlaceHolder 4"/>
           <p:cNvSpPr>
             <a:spLocks noGrp="1"/>
           </p:cNvSpPr>
@@ -2581,7 +2422,7 @@
         <p:spPr>
           <a:xfrm>
             <a:off x="1297440" y="3087720"/>
-            <a:ext cx="3434760" cy="1388160"/>
+            <a:ext cx="3434400" cy="1388160"/>
           </a:xfrm>
           <a:prstGeom prst="rect">
             <a:avLst/>
@@ -2592,10 +2433,7 @@
             <a:normAutofit/>
           </a:bodyPr>
           <a:p>
-            <a:endParaRPr b="0" lang="en-US" sz="1400" spc="-1" strike="noStrike">
-              <a:solidFill>
-                <a:srgbClr val="000000"/>
-              </a:solidFill>
+            <a:endParaRPr b="0" lang="en-US" sz="3200" spc="-1" strike="noStrike">
               <a:latin typeface="Arial"/>
             </a:endParaRPr>
           </a:p>
@@ -2625,7 +2463,7 @@
       </p:grpSpPr>
       <p:sp>
         <p:nvSpPr>
-          <p:cNvPr id="22" name="PlaceHolder 1"/>
+          <p:cNvPr id="21" name="PlaceHolder 1"/>
           <p:cNvSpPr>
             <a:spLocks noGrp="1"/>
           </p:cNvSpPr>
@@ -2636,7 +2474,7 @@
         <p:spPr>
           <a:xfrm>
             <a:off x="1297440" y="393840"/>
-            <a:ext cx="7038720" cy="913680"/>
+            <a:ext cx="7038360" cy="913320"/>
           </a:xfrm>
           <a:prstGeom prst="rect">
             <a:avLst/>
@@ -2647,18 +2485,16 @@
             <a:noAutofit/>
           </a:bodyPr>
           <a:p>
-            <a:endParaRPr b="0" lang="en-US" sz="1400" spc="-1" strike="noStrike">
-              <a:solidFill>
-                <a:srgbClr val="000000"/>
-              </a:solidFill>
-              <a:latin typeface="Arial"/>
-            </a:endParaRPr>
-          </a:p>
-        </p:txBody>
-      </p:sp>
-      <p:sp>
-        <p:nvSpPr>
-          <p:cNvPr id="23" name="PlaceHolder 2"/>
+            <a:pPr algn="ctr"/>
+            <a:endParaRPr b="0" lang="en-US" sz="4400" spc="-1" strike="noStrike">
+              <a:latin typeface="Arial"/>
+            </a:endParaRPr>
+          </a:p>
+        </p:txBody>
+      </p:sp>
+      <p:sp>
+        <p:nvSpPr>
+          <p:cNvPr id="22" name="PlaceHolder 2"/>
           <p:cNvSpPr>
             <a:spLocks noGrp="1"/>
           </p:cNvSpPr>
@@ -2669,7 +2505,7 @@
         <p:spPr>
           <a:xfrm>
             <a:off x="1297440" y="1567440"/>
-            <a:ext cx="3434760" cy="2910960"/>
+            <a:ext cx="3434400" cy="2910600"/>
           </a:xfrm>
           <a:prstGeom prst="rect">
             <a:avLst/>
@@ -2680,18 +2516,15 @@
             <a:normAutofit/>
           </a:bodyPr>
           <a:p>
-            <a:endParaRPr b="0" lang="en-US" sz="1400" spc="-1" strike="noStrike">
-              <a:solidFill>
-                <a:srgbClr val="000000"/>
-              </a:solidFill>
-              <a:latin typeface="Arial"/>
-            </a:endParaRPr>
-          </a:p>
-        </p:txBody>
-      </p:sp>
-      <p:sp>
-        <p:nvSpPr>
-          <p:cNvPr id="24" name="PlaceHolder 3"/>
+            <a:endParaRPr b="0" lang="en-US" sz="3200" spc="-1" strike="noStrike">
+              <a:latin typeface="Arial"/>
+            </a:endParaRPr>
+          </a:p>
+        </p:txBody>
+      </p:sp>
+      <p:sp>
+        <p:nvSpPr>
+          <p:cNvPr id="23" name="PlaceHolder 3"/>
           <p:cNvSpPr>
             <a:spLocks noGrp="1"/>
           </p:cNvSpPr>
@@ -2701,8 +2534,8 @@
         </p:nvSpPr>
         <p:spPr>
           <a:xfrm>
-            <a:off x="4904280" y="1567440"/>
-            <a:ext cx="3434760" cy="1388160"/>
+            <a:off x="4903920" y="1567440"/>
+            <a:ext cx="3434400" cy="1388160"/>
           </a:xfrm>
           <a:prstGeom prst="rect">
             <a:avLst/>
@@ -2713,18 +2546,15 @@
             <a:normAutofit/>
           </a:bodyPr>
           <a:p>
-            <a:endParaRPr b="0" lang="en-US" sz="1400" spc="-1" strike="noStrike">
-              <a:solidFill>
-                <a:srgbClr val="000000"/>
-              </a:solidFill>
-              <a:latin typeface="Arial"/>
-            </a:endParaRPr>
-          </a:p>
-        </p:txBody>
-      </p:sp>
-      <p:sp>
-        <p:nvSpPr>
-          <p:cNvPr id="25" name="PlaceHolder 4"/>
+            <a:endParaRPr b="0" lang="en-US" sz="3200" spc="-1" strike="noStrike">
+              <a:latin typeface="Arial"/>
+            </a:endParaRPr>
+          </a:p>
+        </p:txBody>
+      </p:sp>
+      <p:sp>
+        <p:nvSpPr>
+          <p:cNvPr id="24" name="PlaceHolder 4"/>
           <p:cNvSpPr>
             <a:spLocks noGrp="1"/>
           </p:cNvSpPr>
@@ -2734,8 +2564,8 @@
         </p:nvSpPr>
         <p:spPr>
           <a:xfrm>
-            <a:off x="4904280" y="3087720"/>
-            <a:ext cx="3434760" cy="1388160"/>
+            <a:off x="4903920" y="3087720"/>
+            <a:ext cx="3434400" cy="1388160"/>
           </a:xfrm>
           <a:prstGeom prst="rect">
             <a:avLst/>
@@ -2746,10 +2576,7 @@
             <a:normAutofit/>
           </a:bodyPr>
           <a:p>
-            <a:endParaRPr b="0" lang="en-US" sz="1400" spc="-1" strike="noStrike">
-              <a:solidFill>
-                <a:srgbClr val="000000"/>
-              </a:solidFill>
+            <a:endParaRPr b="0" lang="en-US" sz="3200" spc="-1" strike="noStrike">
               <a:latin typeface="Arial"/>
             </a:endParaRPr>
           </a:p>
@@ -2779,7 +2606,7 @@
       </p:grpSpPr>
       <p:sp>
         <p:nvSpPr>
-          <p:cNvPr id="26" name="PlaceHolder 1"/>
+          <p:cNvPr id="25" name="PlaceHolder 1"/>
           <p:cNvSpPr>
             <a:spLocks noGrp="1"/>
           </p:cNvSpPr>
@@ -2790,7 +2617,7 @@
         <p:spPr>
           <a:xfrm>
             <a:off x="1297440" y="393840"/>
-            <a:ext cx="7038720" cy="913680"/>
+            <a:ext cx="7038360" cy="913320"/>
           </a:xfrm>
           <a:prstGeom prst="rect">
             <a:avLst/>
@@ -2801,18 +2628,16 @@
             <a:noAutofit/>
           </a:bodyPr>
           <a:p>
-            <a:endParaRPr b="0" lang="en-US" sz="1400" spc="-1" strike="noStrike">
-              <a:solidFill>
-                <a:srgbClr val="000000"/>
-              </a:solidFill>
-              <a:latin typeface="Arial"/>
-            </a:endParaRPr>
-          </a:p>
-        </p:txBody>
-      </p:sp>
-      <p:sp>
-        <p:nvSpPr>
-          <p:cNvPr id="27" name="PlaceHolder 2"/>
+            <a:pPr algn="ctr"/>
+            <a:endParaRPr b="0" lang="en-US" sz="4400" spc="-1" strike="noStrike">
+              <a:latin typeface="Arial"/>
+            </a:endParaRPr>
+          </a:p>
+        </p:txBody>
+      </p:sp>
+      <p:sp>
+        <p:nvSpPr>
+          <p:cNvPr id="26" name="PlaceHolder 2"/>
           <p:cNvSpPr>
             <a:spLocks noGrp="1"/>
           </p:cNvSpPr>
@@ -2823,7 +2648,7 @@
         <p:spPr>
           <a:xfrm>
             <a:off x="1297440" y="1567440"/>
-            <a:ext cx="3434760" cy="1388160"/>
+            <a:ext cx="3434400" cy="1388160"/>
           </a:xfrm>
           <a:prstGeom prst="rect">
             <a:avLst/>
@@ -2834,18 +2659,15 @@
             <a:normAutofit/>
           </a:bodyPr>
           <a:p>
-            <a:endParaRPr b="0" lang="en-US" sz="1400" spc="-1" strike="noStrike">
-              <a:solidFill>
-                <a:srgbClr val="000000"/>
-              </a:solidFill>
-              <a:latin typeface="Arial"/>
-            </a:endParaRPr>
-          </a:p>
-        </p:txBody>
-      </p:sp>
-      <p:sp>
-        <p:nvSpPr>
-          <p:cNvPr id="28" name="PlaceHolder 3"/>
+            <a:endParaRPr b="0" lang="en-US" sz="3200" spc="-1" strike="noStrike">
+              <a:latin typeface="Arial"/>
+            </a:endParaRPr>
+          </a:p>
+        </p:txBody>
+      </p:sp>
+      <p:sp>
+        <p:nvSpPr>
+          <p:cNvPr id="27" name="PlaceHolder 3"/>
           <p:cNvSpPr>
             <a:spLocks noGrp="1"/>
           </p:cNvSpPr>
@@ -2855,8 +2677,8 @@
         </p:nvSpPr>
         <p:spPr>
           <a:xfrm>
-            <a:off x="4904280" y="1567440"/>
-            <a:ext cx="3434760" cy="1388160"/>
+            <a:off x="4903920" y="1567440"/>
+            <a:ext cx="3434400" cy="1388160"/>
           </a:xfrm>
           <a:prstGeom prst="rect">
             <a:avLst/>
@@ -2867,18 +2689,15 @@
             <a:normAutofit/>
           </a:bodyPr>
           <a:p>
-            <a:endParaRPr b="0" lang="en-US" sz="1400" spc="-1" strike="noStrike">
-              <a:solidFill>
-                <a:srgbClr val="000000"/>
-              </a:solidFill>
-              <a:latin typeface="Arial"/>
-            </a:endParaRPr>
-          </a:p>
-        </p:txBody>
-      </p:sp>
-      <p:sp>
-        <p:nvSpPr>
-          <p:cNvPr id="29" name="PlaceHolder 4"/>
+            <a:endParaRPr b="0" lang="en-US" sz="3200" spc="-1" strike="noStrike">
+              <a:latin typeface="Arial"/>
+            </a:endParaRPr>
+          </a:p>
+        </p:txBody>
+      </p:sp>
+      <p:sp>
+        <p:nvSpPr>
+          <p:cNvPr id="28" name="PlaceHolder 4"/>
           <p:cNvSpPr>
             <a:spLocks noGrp="1"/>
           </p:cNvSpPr>
@@ -2889,7 +2708,7 @@
         <p:spPr>
           <a:xfrm>
             <a:off x="1297440" y="3087720"/>
-            <a:ext cx="7038720" cy="1388160"/>
+            <a:ext cx="7038360" cy="1388160"/>
           </a:xfrm>
           <a:prstGeom prst="rect">
             <a:avLst/>
@@ -2900,10 +2719,7 @@
             <a:normAutofit/>
           </a:bodyPr>
           <a:p>
-            <a:endParaRPr b="0" lang="en-US" sz="1400" spc="-1" strike="noStrike">
-              <a:solidFill>
-                <a:srgbClr val="000000"/>
-              </a:solidFill>
+            <a:endParaRPr b="0" lang="en-US" sz="3200" spc="-1" strike="noStrike">
               <a:latin typeface="Arial"/>
             </a:endParaRPr>
           </a:p>
@@ -2946,8 +2762,8 @@
         </p:nvSpPr>
         <p:spPr>
           <a:xfrm rot="5400000">
-            <a:off x="7500600" y="0"/>
-            <a:ext cx="1643400" cy="1643400"/>
+            <a:off x="7500960" y="0"/>
+            <a:ext cx="1643040" cy="1643040"/>
           </a:xfrm>
           <a:prstGeom prst="diagStripe">
             <a:avLst>
@@ -2978,10 +2794,10 @@
         </p:nvGrpSpPr>
         <p:grpSpPr>
           <a:xfrm>
-            <a:off x="0" y="1080"/>
-            <a:ext cx="5153400" cy="5133960"/>
-            <a:chOff x="0" y="1080"/>
-            <a:chExt cx="5153400" cy="5133960"/>
+            <a:off x="-360" y="1800"/>
+            <a:ext cx="5153400" cy="5133600"/>
+            <a:chOff x="-360" y="1800"/>
+            <a:chExt cx="5153400" cy="5133600"/>
           </a:xfrm>
         </p:grpSpPr>
         <p:sp>
@@ -2992,8 +2808,8 @@
           </p:nvSpPr>
           <p:spPr>
             <a:xfrm rot="16200000">
-              <a:off x="9720" y="-8280"/>
-              <a:ext cx="5133960" cy="5153400"/>
+              <a:off x="9720" y="-7560"/>
+              <a:ext cx="5133600" cy="5153040"/>
             </a:xfrm>
             <a:prstGeom prst="diagStripe">
               <a:avLst>
@@ -3024,8 +2840,8 @@
           </p:nvSpPr>
           <p:spPr>
             <a:xfrm rot="16200000">
-              <a:off x="7200" y="1135080"/>
-              <a:ext cx="3981960" cy="3996720"/>
+              <a:off x="6840" y="1135440"/>
+              <a:ext cx="3981600" cy="3996360"/>
             </a:xfrm>
             <a:prstGeom prst="diagStripe">
               <a:avLst>
@@ -3056,8 +2872,8 @@
           </p:nvSpPr>
           <p:spPr>
             <a:xfrm rot="16200000">
-              <a:off x="5760" y="-2880"/>
-              <a:ext cx="2291040" cy="2299680"/>
+              <a:off x="5760" y="-2160"/>
+              <a:ext cx="2290680" cy="2299320"/>
             </a:xfrm>
             <a:prstGeom prst="diagStripe">
               <a:avLst>
@@ -3086,8 +2902,8 @@
           </p:nvSpPr>
           <p:spPr>
             <a:xfrm flipH="1">
-              <a:off x="652680" y="588240"/>
-              <a:ext cx="2299680" cy="2291040"/>
+              <a:off x="651960" y="588240"/>
+              <a:ext cx="2299320" cy="2290680"/>
             </a:xfrm>
             <a:prstGeom prst="diagStripe">
               <a:avLst>
@@ -3121,31 +2937,25 @@
         </p:nvSpPr>
         <p:spPr>
           <a:xfrm>
-            <a:off x="3537000" y="1578240"/>
-            <a:ext cx="5017320" cy="1578600"/>
-          </a:xfrm>
-          <a:prstGeom prst="rect">
-            <a:avLst/>
-          </a:prstGeom>
-        </p:spPr>
-        <p:txBody>
-          <a:bodyPr tIns="91440" bIns="91440">
-            <a:normAutofit/>
-          </a:bodyPr>
-          <a:p>
-            <a:r>
-              <a:rPr b="0" lang="en-US" sz="4000" spc="-1" strike="noStrike">
-                <a:solidFill>
-                  <a:srgbClr val="000000"/>
-                </a:solidFill>
+            <a:off x="1297440" y="393840"/>
+            <a:ext cx="7038360" cy="913320"/>
+          </a:xfrm>
+          <a:prstGeom prst="rect">
+            <a:avLst/>
+          </a:prstGeom>
+        </p:spPr>
+        <p:txBody>
+          <a:bodyPr lIns="0" rIns="0" tIns="0" bIns="0" anchor="ctr">
+            <a:noAutofit/>
+          </a:bodyPr>
+          <a:p>
+            <a:r>
+              <a:rPr b="0" lang="en-US" sz="1800" spc="-1" strike="noStrike">
                 <a:latin typeface="Arial"/>
               </a:rPr>
               <a:t>Click to edit the title text format</a:t>
             </a:r>
-            <a:endParaRPr b="0" lang="en-US" sz="4000" spc="-1" strike="noStrike">
-              <a:solidFill>
-                <a:srgbClr val="000000"/>
-              </a:solidFill>
+            <a:endParaRPr b="0" lang="en-US" sz="1800" spc="-1" strike="noStrike">
               <a:latin typeface="Arial"/>
             </a:endParaRPr>
           </a:p>
@@ -3154,54 +2964,6 @@
       <p:sp>
         <p:nvSpPr>
           <p:cNvPr id="7" name="PlaceHolder 8"/>
-          <p:cNvSpPr>
-            <a:spLocks noGrp="1"/>
-          </p:cNvSpPr>
-          <p:nvPr>
-            <p:ph type="sldNum"/>
-          </p:nvPr>
-        </p:nvSpPr>
-        <p:spPr>
-          <a:xfrm>
-            <a:off x="8472600" y="4663080"/>
-            <a:ext cx="548280" cy="393120"/>
-          </a:xfrm>
-          <a:prstGeom prst="rect">
-            <a:avLst/>
-          </a:prstGeom>
-        </p:spPr>
-        <p:txBody>
-          <a:bodyPr tIns="91440" bIns="91440" anchor="ctr">
-            <a:normAutofit/>
-          </a:bodyPr>
-          <a:p>
-            <a:pPr algn="r">
-              <a:lnSpc>
-                <a:spcPct val="100000"/>
-              </a:lnSpc>
-              <a:tabLst>
-                <a:tab algn="l" pos="0"/>
-              </a:tabLst>
-            </a:pPr>
-            <a:fld id="{76B2F01F-2117-4FBD-8731-1EE5885DC6E3}" type="slidenum">
-              <a:rPr b="0" lang="en" sz="1000" spc="-1" strike="noStrike">
-                <a:solidFill>
-                  <a:srgbClr val="ffffff"/>
-                </a:solidFill>
-                <a:latin typeface="Lato"/>
-                <a:ea typeface="Lato"/>
-              </a:rPr>
-              <a:t>&lt;number&gt;</a:t>
-            </a:fld>
-            <a:endParaRPr b="0" lang="en-US" sz="1000" spc="-1" strike="noStrike">
-              <a:latin typeface="Times New Roman"/>
-            </a:endParaRPr>
-          </a:p>
-        </p:txBody>
-      </p:sp>
-      <p:sp>
-        <p:nvSpPr>
-          <p:cNvPr id="8" name="PlaceHolder 9"/>
           <p:cNvSpPr>
             <a:spLocks noGrp="1"/>
           </p:cNvSpPr>
@@ -3235,18 +2997,12 @@
               <a:buChar char=""/>
             </a:pPr>
             <a:r>
-              <a:rPr b="0" lang="en-US" sz="1400" spc="-1" strike="noStrike">
-                <a:solidFill>
-                  <a:srgbClr val="000000"/>
-                </a:solidFill>
+              <a:rPr b="0" lang="en-US" sz="3200" spc="-1" strike="noStrike">
                 <a:latin typeface="Arial"/>
               </a:rPr>
               <a:t>Click to edit the outline text format</a:t>
             </a:r>
-            <a:endParaRPr b="0" lang="en-US" sz="1400" spc="-1" strike="noStrike">
-              <a:solidFill>
-                <a:srgbClr val="000000"/>
-              </a:solidFill>
+            <a:endParaRPr b="0" lang="en-US" sz="3200" spc="-1" strike="noStrike">
               <a:latin typeface="Arial"/>
             </a:endParaRPr>
           </a:p>
@@ -3263,18 +3019,12 @@
               <a:buChar char=""/>
             </a:pPr>
             <a:r>
-              <a:rPr b="0" lang="en-US" sz="1400" spc="-1" strike="noStrike">
-                <a:solidFill>
-                  <a:srgbClr val="000000"/>
-                </a:solidFill>
+              <a:rPr b="0" lang="en-US" sz="2800" spc="-1" strike="noStrike">
                 <a:latin typeface="Arial"/>
               </a:rPr>
               <a:t>Second Outline Level</a:t>
             </a:r>
-            <a:endParaRPr b="0" lang="en-US" sz="1400" spc="-1" strike="noStrike">
-              <a:solidFill>
-                <a:srgbClr val="000000"/>
-              </a:solidFill>
+            <a:endParaRPr b="0" lang="en-US" sz="2800" spc="-1" strike="noStrike">
               <a:latin typeface="Arial"/>
             </a:endParaRPr>
           </a:p>
@@ -3291,18 +3041,12 @@
               <a:buChar char=""/>
             </a:pPr>
             <a:r>
-              <a:rPr b="0" lang="en-US" sz="1400" spc="-1" strike="noStrike">
-                <a:solidFill>
-                  <a:srgbClr val="000000"/>
-                </a:solidFill>
+              <a:rPr b="0" lang="en-US" sz="2400" spc="-1" strike="noStrike">
                 <a:latin typeface="Arial"/>
               </a:rPr>
               <a:t>Third Outline Level</a:t>
             </a:r>
-            <a:endParaRPr b="0" lang="en-US" sz="1400" spc="-1" strike="noStrike">
-              <a:solidFill>
-                <a:srgbClr val="000000"/>
-              </a:solidFill>
+            <a:endParaRPr b="0" lang="en-US" sz="2400" spc="-1" strike="noStrike">
               <a:latin typeface="Arial"/>
             </a:endParaRPr>
           </a:p>
@@ -3319,18 +3063,12 @@
               <a:buChar char=""/>
             </a:pPr>
             <a:r>
-              <a:rPr b="0" lang="en-US" sz="1400" spc="-1" strike="noStrike">
-                <a:solidFill>
-                  <a:srgbClr val="000000"/>
-                </a:solidFill>
+              <a:rPr b="0" lang="en-US" sz="2000" spc="-1" strike="noStrike">
                 <a:latin typeface="Arial"/>
               </a:rPr>
               <a:t>Fourth Outline Level</a:t>
             </a:r>
-            <a:endParaRPr b="0" lang="en-US" sz="1400" spc="-1" strike="noStrike">
-              <a:solidFill>
-                <a:srgbClr val="000000"/>
-              </a:solidFill>
+            <a:endParaRPr b="0" lang="en-US" sz="2000" spc="-1" strike="noStrike">
               <a:latin typeface="Arial"/>
             </a:endParaRPr>
           </a:p>
@@ -3348,17 +3086,11 @@
             </a:pPr>
             <a:r>
               <a:rPr b="0" lang="en-US" sz="2000" spc="-1" strike="noStrike">
-                <a:solidFill>
-                  <a:srgbClr val="000000"/>
-                </a:solidFill>
                 <a:latin typeface="Arial"/>
               </a:rPr>
               <a:t>Fifth Outline Level</a:t>
             </a:r>
             <a:endParaRPr b="0" lang="en-US" sz="2000" spc="-1" strike="noStrike">
-              <a:solidFill>
-                <a:srgbClr val="000000"/>
-              </a:solidFill>
               <a:latin typeface="Arial"/>
             </a:endParaRPr>
           </a:p>
@@ -3376,17 +3108,11 @@
             </a:pPr>
             <a:r>
               <a:rPr b="0" lang="en-US" sz="2000" spc="-1" strike="noStrike">
-                <a:solidFill>
-                  <a:srgbClr val="000000"/>
-                </a:solidFill>
                 <a:latin typeface="Arial"/>
               </a:rPr>
               <a:t>Sixth Outline Level</a:t>
             </a:r>
             <a:endParaRPr b="0" lang="en-US" sz="2000" spc="-1" strike="noStrike">
-              <a:solidFill>
-                <a:srgbClr val="000000"/>
-              </a:solidFill>
               <a:latin typeface="Arial"/>
             </a:endParaRPr>
           </a:p>
@@ -3404,17 +3130,11 @@
             </a:pPr>
             <a:r>
               <a:rPr b="0" lang="en-US" sz="2000" spc="-1" strike="noStrike">
-                <a:solidFill>
-                  <a:srgbClr val="000000"/>
-                </a:solidFill>
                 <a:latin typeface="Arial"/>
               </a:rPr>
               <a:t>Seventh Outline Level</a:t>
             </a:r>
             <a:endParaRPr b="0" lang="en-US" sz="2000" spc="-1" strike="noStrike">
-              <a:solidFill>
-                <a:srgbClr val="000000"/>
-              </a:solidFill>
               <a:latin typeface="Arial"/>
             </a:endParaRPr>
           </a:p>
@@ -3466,28 +3186,28 @@
       </p:grpSpPr>
       <p:grpSp>
         <p:nvGrpSpPr>
-          <p:cNvPr id="45" name="Group 1"/>
+          <p:cNvPr id="44" name="Group 1"/>
           <p:cNvGrpSpPr/>
           <p:nvPr/>
         </p:nvGrpSpPr>
         <p:grpSpPr>
           <a:xfrm>
-            <a:off x="0" y="381240"/>
-            <a:ext cx="1037520" cy="1015920"/>
-            <a:chOff x="0" y="381240"/>
-            <a:chExt cx="1037520" cy="1015920"/>
+            <a:off x="0" y="381600"/>
+            <a:ext cx="1036800" cy="1015200"/>
+            <a:chOff x="0" y="381600"/>
+            <a:chExt cx="1036800" cy="1015200"/>
           </a:xfrm>
         </p:grpSpPr>
         <p:sp>
           <p:nvSpPr>
-            <p:cNvPr id="46" name="CustomShape 2"/>
+            <p:cNvPr id="45" name="CustomShape 2"/>
             <p:cNvSpPr/>
             <p:nvPr/>
           </p:nvSpPr>
           <p:spPr>
             <a:xfrm rot="16200000">
-              <a:off x="0" y="381240"/>
-              <a:ext cx="808560" cy="808560"/>
+              <a:off x="0" y="381600"/>
+              <a:ext cx="808200" cy="808200"/>
             </a:xfrm>
             <a:prstGeom prst="diagStripe">
               <a:avLst>
@@ -3510,14 +3230,14 @@
         </p:sp>
         <p:sp>
           <p:nvSpPr>
-            <p:cNvPr id="47" name="CustomShape 3"/>
+            <p:cNvPr id="46" name="CustomShape 3"/>
             <p:cNvSpPr/>
             <p:nvPr/>
           </p:nvSpPr>
           <p:spPr>
             <a:xfrm flipH="1">
-              <a:off x="228960" y="588600"/>
-              <a:ext cx="808560" cy="808560"/>
+              <a:off x="228240" y="588600"/>
+              <a:ext cx="808200" cy="808200"/>
             </a:xfrm>
             <a:prstGeom prst="diagStripe">
               <a:avLst>
@@ -3541,7 +3261,7 @@
       </p:grpSp>
       <p:sp>
         <p:nvSpPr>
-          <p:cNvPr id="48" name="PlaceHolder 4"/>
+          <p:cNvPr id="47" name="PlaceHolder 4"/>
           <p:cNvSpPr>
             <a:spLocks noGrp="1"/>
           </p:cNvSpPr>
@@ -3552,38 +3272,32 @@
         <p:spPr>
           <a:xfrm>
             <a:off x="1297440" y="393840"/>
-            <a:ext cx="7038720" cy="913680"/>
-          </a:xfrm>
-          <a:prstGeom prst="rect">
-            <a:avLst/>
-          </a:prstGeom>
-        </p:spPr>
-        <p:txBody>
-          <a:bodyPr tIns="91440" bIns="91440">
-            <a:normAutofit/>
-          </a:bodyPr>
-          <a:p>
-            <a:r>
-              <a:rPr b="0" lang="en-US" sz="2400" spc="-1" strike="noStrike">
-                <a:solidFill>
-                  <a:srgbClr val="000000"/>
-                </a:solidFill>
+            <a:ext cx="7038360" cy="913320"/>
+          </a:xfrm>
+          <a:prstGeom prst="rect">
+            <a:avLst/>
+          </a:prstGeom>
+        </p:spPr>
+        <p:txBody>
+          <a:bodyPr lIns="0" rIns="0" tIns="0" bIns="0" anchor="ctr">
+            <a:noAutofit/>
+          </a:bodyPr>
+          <a:p>
+            <a:r>
+              <a:rPr b="0" lang="en-US" sz="1800" spc="-1" strike="noStrike">
                 <a:latin typeface="Arial"/>
               </a:rPr>
               <a:t>Click to edit the title text format</a:t>
             </a:r>
-            <a:endParaRPr b="0" lang="en-US" sz="2400" spc="-1" strike="noStrike">
-              <a:solidFill>
-                <a:srgbClr val="000000"/>
-              </a:solidFill>
-              <a:latin typeface="Arial"/>
-            </a:endParaRPr>
-          </a:p>
-        </p:txBody>
-      </p:sp>
-      <p:sp>
-        <p:nvSpPr>
-          <p:cNvPr id="49" name="PlaceHolder 5"/>
+            <a:endParaRPr b="0" lang="en-US" sz="1800" spc="-1" strike="noStrike">
+              <a:latin typeface="Arial"/>
+            </a:endParaRPr>
+          </a:p>
+        </p:txBody>
+      </p:sp>
+      <p:sp>
+        <p:nvSpPr>
+          <p:cNvPr id="48" name="PlaceHolder 5"/>
           <p:cNvSpPr>
             <a:spLocks noGrp="1"/>
           </p:cNvSpPr>
@@ -3594,14 +3308,14 @@
         <p:spPr>
           <a:xfrm>
             <a:off x="1297440" y="1567440"/>
-            <a:ext cx="7038720" cy="2910960"/>
-          </a:xfrm>
-          <a:prstGeom prst="rect">
-            <a:avLst/>
-          </a:prstGeom>
-        </p:spPr>
-        <p:txBody>
-          <a:bodyPr tIns="91440" bIns="91440">
+            <a:ext cx="7038360" cy="2910600"/>
+          </a:xfrm>
+          <a:prstGeom prst="rect">
+            <a:avLst/>
+          </a:prstGeom>
+        </p:spPr>
+        <p:txBody>
+          <a:bodyPr lIns="0" rIns="0" tIns="0" bIns="0">
             <a:normAutofit/>
           </a:bodyPr>
           <a:p>
@@ -3617,18 +3331,12 @@
               <a:buChar char=""/>
             </a:pPr>
             <a:r>
-              <a:rPr b="0" lang="en-US" sz="1300" spc="-1" strike="noStrike">
-                <a:solidFill>
-                  <a:srgbClr val="000000"/>
-                </a:solidFill>
+              <a:rPr b="0" lang="en-US" sz="1800" spc="-1" strike="noStrike">
                 <a:latin typeface="Arial"/>
               </a:rPr>
               <a:t>Click to edit the outline text format</a:t>
             </a:r>
-            <a:endParaRPr b="0" lang="en-US" sz="1300" spc="-1" strike="noStrike">
-              <a:solidFill>
-                <a:srgbClr val="000000"/>
-              </a:solidFill>
+            <a:endParaRPr b="0" lang="en-US" sz="1800" spc="-1" strike="noStrike">
               <a:latin typeface="Arial"/>
             </a:endParaRPr>
           </a:p>
@@ -3645,18 +3353,12 @@
               <a:buChar char=""/>
             </a:pPr>
             <a:r>
-              <a:rPr b="0" lang="en-US" sz="1300" spc="-1" strike="noStrike">
-                <a:solidFill>
-                  <a:srgbClr val="000000"/>
-                </a:solidFill>
+              <a:rPr b="0" lang="en-US" sz="1800" spc="-1" strike="noStrike">
                 <a:latin typeface="Arial"/>
               </a:rPr>
               <a:t>Second Outline Level</a:t>
             </a:r>
-            <a:endParaRPr b="0" lang="en-US" sz="1300" spc="-1" strike="noStrike">
-              <a:solidFill>
-                <a:srgbClr val="000000"/>
-              </a:solidFill>
+            <a:endParaRPr b="0" lang="en-US" sz="1800" spc="-1" strike="noStrike">
               <a:latin typeface="Arial"/>
             </a:endParaRPr>
           </a:p>
@@ -3673,18 +3375,12 @@
               <a:buChar char=""/>
             </a:pPr>
             <a:r>
-              <a:rPr b="0" lang="en-US" sz="1300" spc="-1" strike="noStrike">
-                <a:solidFill>
-                  <a:srgbClr val="000000"/>
-                </a:solidFill>
+              <a:rPr b="0" lang="en-US" sz="1800" spc="-1" strike="noStrike">
                 <a:latin typeface="Arial"/>
               </a:rPr>
               <a:t>Third Outline Level</a:t>
             </a:r>
-            <a:endParaRPr b="0" lang="en-US" sz="1300" spc="-1" strike="noStrike">
-              <a:solidFill>
-                <a:srgbClr val="000000"/>
-              </a:solidFill>
+            <a:endParaRPr b="0" lang="en-US" sz="1800" spc="-1" strike="noStrike">
               <a:latin typeface="Arial"/>
             </a:endParaRPr>
           </a:p>
@@ -3701,18 +3397,12 @@
               <a:buChar char=""/>
             </a:pPr>
             <a:r>
-              <a:rPr b="0" lang="en-US" sz="1300" spc="-1" strike="noStrike">
-                <a:solidFill>
-                  <a:srgbClr val="000000"/>
-                </a:solidFill>
+              <a:rPr b="0" lang="en-US" sz="1800" spc="-1" strike="noStrike">
                 <a:latin typeface="Arial"/>
               </a:rPr>
               <a:t>Fourth Outline Level</a:t>
             </a:r>
-            <a:endParaRPr b="0" lang="en-US" sz="1300" spc="-1" strike="noStrike">
-              <a:solidFill>
-                <a:srgbClr val="000000"/>
-              </a:solidFill>
+            <a:endParaRPr b="0" lang="en-US" sz="1800" spc="-1" strike="noStrike">
               <a:latin typeface="Arial"/>
             </a:endParaRPr>
           </a:p>
@@ -3729,18 +3419,12 @@
               <a:buChar char=""/>
             </a:pPr>
             <a:r>
-              <a:rPr b="0" lang="en-US" sz="1300" spc="-1" strike="noStrike">
-                <a:solidFill>
-                  <a:srgbClr val="000000"/>
-                </a:solidFill>
+              <a:rPr b="0" lang="en-US" sz="1800" spc="-1" strike="noStrike">
                 <a:latin typeface="Arial"/>
               </a:rPr>
               <a:t>Fifth Outline Level</a:t>
             </a:r>
-            <a:endParaRPr b="0" lang="en-US" sz="1300" spc="-1" strike="noStrike">
-              <a:solidFill>
-                <a:srgbClr val="000000"/>
-              </a:solidFill>
+            <a:endParaRPr b="0" lang="en-US" sz="1800" spc="-1" strike="noStrike">
               <a:latin typeface="Arial"/>
             </a:endParaRPr>
           </a:p>
@@ -3757,18 +3441,12 @@
               <a:buChar char=""/>
             </a:pPr>
             <a:r>
-              <a:rPr b="0" lang="en-US" sz="1300" spc="-1" strike="noStrike">
-                <a:solidFill>
-                  <a:srgbClr val="000000"/>
-                </a:solidFill>
+              <a:rPr b="0" lang="en-US" sz="1800" spc="-1" strike="noStrike">
                 <a:latin typeface="Arial"/>
               </a:rPr>
               <a:t>Sixth Outline Level</a:t>
             </a:r>
-            <a:endParaRPr b="0" lang="en-US" sz="1300" spc="-1" strike="noStrike">
-              <a:solidFill>
-                <a:srgbClr val="000000"/>
-              </a:solidFill>
+            <a:endParaRPr b="0" lang="en-US" sz="1800" spc="-1" strike="noStrike">
               <a:latin typeface="Arial"/>
             </a:endParaRPr>
           </a:p>
@@ -3785,67 +3463,13 @@
               <a:buChar char=""/>
             </a:pPr>
             <a:r>
-              <a:rPr b="0" lang="en-US" sz="1300" spc="-1" strike="noStrike">
-                <a:solidFill>
-                  <a:srgbClr val="000000"/>
-                </a:solidFill>
+              <a:rPr b="0" lang="en-US" sz="1800" spc="-1" strike="noStrike">
                 <a:latin typeface="Arial"/>
               </a:rPr>
               <a:t>Seventh Outline Level</a:t>
             </a:r>
-            <a:endParaRPr b="0" lang="en-US" sz="1300" spc="-1" strike="noStrike">
-              <a:solidFill>
-                <a:srgbClr val="000000"/>
-              </a:solidFill>
-              <a:latin typeface="Arial"/>
-            </a:endParaRPr>
-          </a:p>
-        </p:txBody>
-      </p:sp>
-      <p:sp>
-        <p:nvSpPr>
-          <p:cNvPr id="50" name="PlaceHolder 6"/>
-          <p:cNvSpPr>
-            <a:spLocks noGrp="1"/>
-          </p:cNvSpPr>
-          <p:nvPr>
-            <p:ph type="sldNum"/>
-          </p:nvPr>
-        </p:nvSpPr>
-        <p:spPr>
-          <a:xfrm>
-            <a:off x="8472600" y="4663080"/>
-            <a:ext cx="548280" cy="393120"/>
-          </a:xfrm>
-          <a:prstGeom prst="rect">
-            <a:avLst/>
-          </a:prstGeom>
-        </p:spPr>
-        <p:txBody>
-          <a:bodyPr tIns="91440" bIns="91440" anchor="ctr">
-            <a:normAutofit/>
-          </a:bodyPr>
-          <a:p>
-            <a:pPr algn="r">
-              <a:lnSpc>
-                <a:spcPct val="100000"/>
-              </a:lnSpc>
-              <a:tabLst>
-                <a:tab algn="l" pos="0"/>
-              </a:tabLst>
-            </a:pPr>
-            <a:fld id="{9A19F1A7-0D8E-4423-B21F-12A3E1B8B581}" type="slidenum">
-              <a:rPr b="0" lang="en" sz="1000" spc="-1" strike="noStrike">
-                <a:solidFill>
-                  <a:srgbClr val="ffffff"/>
-                </a:solidFill>
-                <a:latin typeface="Lato"/>
-                <a:ea typeface="Lato"/>
-              </a:rPr>
-              <a:t>&lt;number&gt;</a:t>
-            </a:fld>
-            <a:endParaRPr b="0" lang="en-US" sz="1000" spc="-1" strike="noStrike">
-              <a:latin typeface="Times New Roman"/>
+            <a:endParaRPr b="0" lang="en-US" sz="1800" spc="-1" strike="noStrike">
+              <a:latin typeface="Arial"/>
             </a:endParaRPr>
           </a:p>
         </p:txBody>
@@ -3889,14 +3513,14 @@
       </p:grpSpPr>
       <p:sp>
         <p:nvSpPr>
-          <p:cNvPr id="87" name="TextShape 1"/>
-          <p:cNvSpPr txBox="1"/>
+          <p:cNvPr id="85" name="CustomShape 1"/>
+          <p:cNvSpPr/>
           <p:nvPr/>
         </p:nvSpPr>
         <p:spPr>
           <a:xfrm>
             <a:off x="2838600" y="1578240"/>
-            <a:ext cx="5715720" cy="1578600"/>
+            <a:ext cx="5715360" cy="1578240"/>
           </a:xfrm>
           <a:prstGeom prst="rect">
             <a:avLst/>
@@ -3906,8 +3530,14 @@
             <a:noFill/>
           </a:ln>
         </p:spPr>
-        <p:txBody>
-          <a:bodyPr tIns="91440" bIns="91440">
+        <p:style>
+          <a:lnRef idx="0"/>
+          <a:fillRef idx="0"/>
+          <a:effectRef idx="0"/>
+          <a:fontRef idx="minor"/>
+        </p:style>
+        <p:txBody>
+          <a:bodyPr lIns="90000" rIns="90000" tIns="91440" bIns="91440">
             <a:normAutofit/>
           </a:bodyPr>
           <a:p>
@@ -3930,24 +3560,21 @@
               <a:t>База знаний о музыкальных группах</a:t>
             </a:r>
             <a:endParaRPr b="0" lang="en-US" sz="4000" spc="-1" strike="noStrike">
-              <a:solidFill>
-                <a:srgbClr val="000000"/>
-              </a:solidFill>
-              <a:latin typeface="Arial"/>
-            </a:endParaRPr>
-          </a:p>
-        </p:txBody>
-      </p:sp>
-      <p:sp>
-        <p:nvSpPr>
-          <p:cNvPr id="88" name="TextShape 2"/>
-          <p:cNvSpPr txBox="1"/>
+              <a:latin typeface="Arial"/>
+            </a:endParaRPr>
+          </a:p>
+        </p:txBody>
+      </p:sp>
+      <p:sp>
+        <p:nvSpPr>
+          <p:cNvPr id="86" name="CustomShape 2"/>
+          <p:cNvSpPr/>
           <p:nvPr/>
         </p:nvSpPr>
         <p:spPr>
           <a:xfrm>
             <a:off x="5083920" y="3925080"/>
-            <a:ext cx="3470400" cy="505800"/>
+            <a:ext cx="3470040" cy="505440"/>
           </a:xfrm>
           <a:prstGeom prst="rect">
             <a:avLst/>
@@ -3957,17 +3584,12 @@
             <a:noFill/>
           </a:ln>
         </p:spPr>
-        <p:txBody>
-          <a:bodyPr tIns="91440" bIns="91440">
-            <a:normAutofit/>
-          </a:bodyPr>
-          <a:p>
-            <a:pPr algn="ctr"/>
-            <a:endParaRPr b="0" lang="en-US" sz="3200" spc="-1" strike="noStrike">
-              <a:latin typeface="Arial"/>
-            </a:endParaRPr>
-          </a:p>
-        </p:txBody>
+        <p:style>
+          <a:lnRef idx="0"/>
+          <a:fillRef idx="0"/>
+          <a:effectRef idx="0"/>
+          <a:fontRef idx="minor"/>
+        </p:style>
       </p:sp>
     </p:spTree>
   </p:cSld>
@@ -4001,14 +3623,14 @@
       </p:grpSpPr>
       <p:sp>
         <p:nvSpPr>
-          <p:cNvPr id="89" name="TextShape 1"/>
-          <p:cNvSpPr txBox="1"/>
+          <p:cNvPr id="87" name="CustomShape 1"/>
+          <p:cNvSpPr/>
           <p:nvPr/>
         </p:nvSpPr>
         <p:spPr>
           <a:xfrm>
             <a:off x="1297440" y="393840"/>
-            <a:ext cx="7038720" cy="913680"/>
+            <a:ext cx="7038360" cy="913320"/>
           </a:xfrm>
           <a:prstGeom prst="rect">
             <a:avLst/>
@@ -4018,8 +3640,14 @@
             <a:noFill/>
           </a:ln>
         </p:spPr>
-        <p:txBody>
-          <a:bodyPr tIns="91440" bIns="91440">
+        <p:style>
+          <a:lnRef idx="0"/>
+          <a:fillRef idx="0"/>
+          <a:effectRef idx="0"/>
+          <a:fontRef idx="minor"/>
+        </p:style>
+        <p:txBody>
+          <a:bodyPr lIns="90000" rIns="90000" tIns="91440" bIns="91440">
             <a:normAutofit/>
           </a:bodyPr>
           <a:p>
@@ -4042,24 +3670,21 @@
               <a:t>Для чего?</a:t>
             </a:r>
             <a:endParaRPr b="0" lang="en-US" sz="2400" spc="-1" strike="noStrike">
-              <a:solidFill>
-                <a:srgbClr val="000000"/>
-              </a:solidFill>
-              <a:latin typeface="Arial"/>
-            </a:endParaRPr>
-          </a:p>
-        </p:txBody>
-      </p:sp>
-      <p:sp>
-        <p:nvSpPr>
-          <p:cNvPr id="90" name="TextShape 2"/>
-          <p:cNvSpPr txBox="1"/>
+              <a:latin typeface="Arial"/>
+            </a:endParaRPr>
+          </a:p>
+        </p:txBody>
+      </p:sp>
+      <p:sp>
+        <p:nvSpPr>
+          <p:cNvPr id="88" name="CustomShape 2"/>
+          <p:cNvSpPr/>
           <p:nvPr/>
         </p:nvSpPr>
         <p:spPr>
           <a:xfrm>
             <a:off x="1297440" y="1567440"/>
-            <a:ext cx="7038720" cy="2910960"/>
+            <a:ext cx="7038360" cy="2910600"/>
           </a:xfrm>
           <a:prstGeom prst="rect">
             <a:avLst/>
@@ -4069,12 +3694,18 @@
             <a:noFill/>
           </a:ln>
         </p:spPr>
-        <p:txBody>
-          <a:bodyPr tIns="91440" bIns="91440">
-            <a:normAutofit/>
-          </a:bodyPr>
-          <a:p>
-            <a:pPr marL="457200" indent="-323640">
+        <p:style>
+          <a:lnRef idx="0"/>
+          <a:fillRef idx="0"/>
+          <a:effectRef idx="0"/>
+          <a:fontRef idx="minor"/>
+        </p:style>
+        <p:txBody>
+          <a:bodyPr lIns="90000" rIns="90000" tIns="91440" bIns="91440">
+            <a:normAutofit/>
+          </a:bodyPr>
+          <a:p>
+            <a:pPr marL="457200" indent="-323280">
               <a:lnSpc>
                 <a:spcPct val="115000"/>
               </a:lnSpc>
@@ -4101,18 +3732,16 @@
                   <a:srgbClr val="ffffff"/>
                 </a:solidFill>
                 <a:latin typeface="Lato"/>
+                <a:ea typeface="Lato"/>
               </a:rPr>
               <a:t> </a:t>
             </a:r>
             <a:endParaRPr b="0" lang="en-US" sz="1500" spc="-1" strike="noStrike">
-              <a:solidFill>
-                <a:srgbClr val="000000"/>
-              </a:solidFill>
-              <a:latin typeface="Arial"/>
-            </a:endParaRPr>
-          </a:p>
-          <a:p>
-            <a:pPr marL="457200" indent="-323640">
+              <a:latin typeface="Arial"/>
+            </a:endParaRPr>
+          </a:p>
+          <a:p>
+            <a:pPr marL="457200" indent="-323280">
               <a:lnSpc>
                 <a:spcPct val="115000"/>
               </a:lnSpc>
@@ -4139,18 +3768,16 @@
                   <a:srgbClr val="ffffff"/>
                 </a:solidFill>
                 <a:latin typeface="Lato"/>
+                <a:ea typeface="Lato"/>
               </a:rPr>
               <a:t> </a:t>
             </a:r>
             <a:endParaRPr b="0" lang="en-US" sz="1500" spc="-1" strike="noStrike">
-              <a:solidFill>
-                <a:srgbClr val="000000"/>
-              </a:solidFill>
-              <a:latin typeface="Arial"/>
-            </a:endParaRPr>
-          </a:p>
-          <a:p>
-            <a:pPr marL="457200" indent="-323640">
+              <a:latin typeface="Arial"/>
+            </a:endParaRPr>
+          </a:p>
+          <a:p>
+            <a:pPr marL="457200" indent="-323280">
               <a:lnSpc>
                 <a:spcPct val="115000"/>
               </a:lnSpc>
@@ -4171,9 +3798,6 @@
               <a:t>Возможность найти группы, жанр которых совпадает с “любимой” группой.</a:t>
             </a:r>
             <a:endParaRPr b="0" lang="en-US" sz="1500" spc="-1" strike="noStrike">
-              <a:solidFill>
-                <a:srgbClr val="000000"/>
-              </a:solidFill>
               <a:latin typeface="Arial"/>
             </a:endParaRPr>
           </a:p>
@@ -4211,14 +3835,14 @@
       </p:grpSpPr>
       <p:sp>
         <p:nvSpPr>
-          <p:cNvPr id="91" name="TextShape 1"/>
-          <p:cNvSpPr txBox="1"/>
+          <p:cNvPr id="89" name="CustomShape 1"/>
+          <p:cNvSpPr/>
           <p:nvPr/>
         </p:nvSpPr>
         <p:spPr>
           <a:xfrm>
             <a:off x="1297440" y="393840"/>
-            <a:ext cx="7038720" cy="913680"/>
+            <a:ext cx="7038360" cy="913320"/>
           </a:xfrm>
           <a:prstGeom prst="rect">
             <a:avLst/>
@@ -4228,8 +3852,14 @@
             <a:noFill/>
           </a:ln>
         </p:spPr>
-        <p:txBody>
-          <a:bodyPr tIns="91440" bIns="91440">
+        <p:style>
+          <a:lnRef idx="0"/>
+          <a:fillRef idx="0"/>
+          <a:effectRef idx="0"/>
+          <a:fontRef idx="minor"/>
+        </p:style>
+        <p:txBody>
+          <a:bodyPr lIns="90000" rIns="90000" tIns="91440" bIns="91440">
             <a:normAutofit/>
           </a:bodyPr>
           <a:p>
@@ -4252,24 +3882,21 @@
               <a:t>Хранимая информация</a:t>
             </a:r>
             <a:endParaRPr b="0" lang="en-US" sz="2400" spc="-1" strike="noStrike">
-              <a:solidFill>
-                <a:srgbClr val="000000"/>
-              </a:solidFill>
-              <a:latin typeface="Arial"/>
-            </a:endParaRPr>
-          </a:p>
-        </p:txBody>
-      </p:sp>
-      <p:sp>
-        <p:nvSpPr>
-          <p:cNvPr id="92" name="TextShape 2"/>
-          <p:cNvSpPr txBox="1"/>
+              <a:latin typeface="Arial"/>
+            </a:endParaRPr>
+          </a:p>
+        </p:txBody>
+      </p:sp>
+      <p:sp>
+        <p:nvSpPr>
+          <p:cNvPr id="90" name="CustomShape 2"/>
+          <p:cNvSpPr/>
           <p:nvPr/>
         </p:nvSpPr>
         <p:spPr>
           <a:xfrm>
             <a:off x="1297440" y="1567440"/>
-            <a:ext cx="7038720" cy="2744280"/>
+            <a:ext cx="7038360" cy="2743920"/>
           </a:xfrm>
           <a:prstGeom prst="rect">
             <a:avLst/>
@@ -4279,12 +3906,18 @@
             <a:noFill/>
           </a:ln>
         </p:spPr>
-        <p:txBody>
-          <a:bodyPr tIns="91440" bIns="91440">
-            <a:normAutofit/>
-          </a:bodyPr>
-          <a:p>
-            <a:pPr marL="457200" indent="-323640">
+        <p:style>
+          <a:lnRef idx="0"/>
+          <a:fillRef idx="0"/>
+          <a:effectRef idx="0"/>
+          <a:fontRef idx="minor"/>
+        </p:style>
+        <p:txBody>
+          <a:bodyPr lIns="90000" rIns="90000" tIns="91440" bIns="91440">
+            <a:normAutofit/>
+          </a:bodyPr>
+          <a:p>
+            <a:pPr marL="457200" indent="-323280">
               <a:lnSpc>
                 <a:spcPct val="115000"/>
               </a:lnSpc>
@@ -4305,14 +3938,11 @@
               <a:t>Годы активности</a:t>
             </a:r>
             <a:endParaRPr b="0" lang="en-US" sz="1500" spc="-1" strike="noStrike">
-              <a:solidFill>
-                <a:srgbClr val="000000"/>
-              </a:solidFill>
-              <a:latin typeface="Arial"/>
-            </a:endParaRPr>
-          </a:p>
-          <a:p>
-            <a:pPr marL="457200" indent="-323640">
+              <a:latin typeface="Arial"/>
+            </a:endParaRPr>
+          </a:p>
+          <a:p>
+            <a:pPr marL="457200" indent="-323280">
               <a:lnSpc>
                 <a:spcPct val="115000"/>
               </a:lnSpc>
@@ -4333,14 +3963,11 @@
               <a:t>Язык песен</a:t>
             </a:r>
             <a:endParaRPr b="0" lang="en-US" sz="1500" spc="-1" strike="noStrike">
-              <a:solidFill>
-                <a:srgbClr val="000000"/>
-              </a:solidFill>
-              <a:latin typeface="Arial"/>
-            </a:endParaRPr>
-          </a:p>
-          <a:p>
-            <a:pPr marL="457200" indent="-323640">
+              <a:latin typeface="Arial"/>
+            </a:endParaRPr>
+          </a:p>
+          <a:p>
+            <a:pPr marL="457200" indent="-323280">
               <a:lnSpc>
                 <a:spcPct val="115000"/>
               </a:lnSpc>
@@ -4361,14 +3988,11 @@
               <a:t>Жанр</a:t>
             </a:r>
             <a:endParaRPr b="0" lang="en-US" sz="1500" spc="-1" strike="noStrike">
-              <a:solidFill>
-                <a:srgbClr val="000000"/>
-              </a:solidFill>
-              <a:latin typeface="Arial"/>
-            </a:endParaRPr>
-          </a:p>
-          <a:p>
-            <a:pPr marL="457200" indent="-323640">
+              <a:latin typeface="Arial"/>
+            </a:endParaRPr>
+          </a:p>
+          <a:p>
+            <a:pPr marL="457200" indent="-323280">
               <a:lnSpc>
                 <a:spcPct val="115000"/>
               </a:lnSpc>
@@ -4389,14 +4013,11 @@
               <a:t>Страна </a:t>
             </a:r>
             <a:endParaRPr b="0" lang="en-US" sz="1500" spc="-1" strike="noStrike">
-              <a:solidFill>
-                <a:srgbClr val="000000"/>
-              </a:solidFill>
-              <a:latin typeface="Arial"/>
-            </a:endParaRPr>
-          </a:p>
-          <a:p>
-            <a:pPr marL="457200" indent="-323640">
+              <a:latin typeface="Arial"/>
+            </a:endParaRPr>
+          </a:p>
+          <a:p>
+            <a:pPr marL="457200" indent="-323280">
               <a:lnSpc>
                 <a:spcPct val="115000"/>
               </a:lnSpc>
@@ -4417,14 +4038,11 @@
               <a:t>Награды</a:t>
             </a:r>
             <a:endParaRPr b="0" lang="en-US" sz="1500" spc="-1" strike="noStrike">
-              <a:solidFill>
-                <a:srgbClr val="000000"/>
-              </a:solidFill>
-              <a:latin typeface="Arial"/>
-            </a:endParaRPr>
-          </a:p>
-          <a:p>
-            <a:pPr marL="457200" indent="-323640">
+              <a:latin typeface="Arial"/>
+            </a:endParaRPr>
+          </a:p>
+          <a:p>
+            <a:pPr marL="457200" indent="-323280">
               <a:lnSpc>
                 <a:spcPct val="115000"/>
               </a:lnSpc>
@@ -4445,9 +4063,6 @@
               <a:t>Участники</a:t>
             </a:r>
             <a:endParaRPr b="0" lang="en-US" sz="1500" spc="-1" strike="noStrike">
-              <a:solidFill>
-                <a:srgbClr val="000000"/>
-              </a:solidFill>
               <a:latin typeface="Arial"/>
             </a:endParaRPr>
           </a:p>
@@ -4485,14 +4100,14 @@
       </p:grpSpPr>
       <p:sp>
         <p:nvSpPr>
-          <p:cNvPr id="93" name="TextShape 1"/>
-          <p:cNvSpPr txBox="1"/>
+          <p:cNvPr id="91" name="CustomShape 1"/>
+          <p:cNvSpPr/>
           <p:nvPr/>
         </p:nvSpPr>
         <p:spPr>
           <a:xfrm>
             <a:off x="1297440" y="393840"/>
-            <a:ext cx="7038720" cy="913680"/>
+            <a:ext cx="7038360" cy="913320"/>
           </a:xfrm>
           <a:prstGeom prst="rect">
             <a:avLst/>
@@ -4502,8 +4117,14 @@
             <a:noFill/>
           </a:ln>
         </p:spPr>
-        <p:txBody>
-          <a:bodyPr tIns="91440" bIns="91440">
+        <p:style>
+          <a:lnRef idx="0"/>
+          <a:fillRef idx="0"/>
+          <a:effectRef idx="0"/>
+          <a:fontRef idx="minor"/>
+        </p:style>
+        <p:txBody>
+          <a:bodyPr lIns="90000" rIns="90000" tIns="91440" bIns="91440">
             <a:normAutofit/>
           </a:bodyPr>
           <a:p>
@@ -4526,24 +4147,21 @@
               <a:t>Ресурсы</a:t>
             </a:r>
             <a:endParaRPr b="0" lang="en-US" sz="2400" spc="-1" strike="noStrike">
-              <a:solidFill>
-                <a:srgbClr val="000000"/>
-              </a:solidFill>
-              <a:latin typeface="Arial"/>
-            </a:endParaRPr>
-          </a:p>
-        </p:txBody>
-      </p:sp>
-      <p:sp>
-        <p:nvSpPr>
-          <p:cNvPr id="94" name="TextShape 2"/>
-          <p:cNvSpPr txBox="1"/>
+              <a:latin typeface="Arial"/>
+            </a:endParaRPr>
+          </a:p>
+        </p:txBody>
+      </p:sp>
+      <p:sp>
+        <p:nvSpPr>
+          <p:cNvPr id="92" name="CustomShape 2"/>
+          <p:cNvSpPr/>
           <p:nvPr/>
         </p:nvSpPr>
         <p:spPr>
           <a:xfrm>
             <a:off x="1297440" y="1567440"/>
-            <a:ext cx="7038720" cy="2910960"/>
+            <a:ext cx="7038360" cy="2910600"/>
           </a:xfrm>
           <a:prstGeom prst="rect">
             <a:avLst/>
@@ -4553,12 +4171,18 @@
             <a:noFill/>
           </a:ln>
         </p:spPr>
-        <p:txBody>
-          <a:bodyPr tIns="91440" bIns="91440">
-            <a:normAutofit/>
-          </a:bodyPr>
-          <a:p>
-            <a:pPr marL="457200" indent="-310680">
+        <p:style>
+          <a:lnRef idx="0"/>
+          <a:fillRef idx="0"/>
+          <a:effectRef idx="0"/>
+          <a:fontRef idx="minor"/>
+        </p:style>
+        <p:txBody>
+          <a:bodyPr lIns="90000" rIns="90000" tIns="91440" bIns="91440">
+            <a:normAutofit/>
+          </a:bodyPr>
+          <a:p>
+            <a:pPr marL="457200" indent="-310320">
               <a:lnSpc>
                 <a:spcPct val="115000"/>
               </a:lnSpc>
@@ -4663,18 +4287,16 @@
                   <a:srgbClr val="ffffff"/>
                 </a:solidFill>
                 <a:latin typeface="Lato"/>
+                <a:ea typeface="Lato"/>
               </a:rPr>
               <a:t> </a:t>
             </a:r>
             <a:endParaRPr b="0" lang="en-US" sz="1300" spc="-1" strike="noStrike">
-              <a:solidFill>
-                <a:srgbClr val="000000"/>
-              </a:solidFill>
-              <a:latin typeface="Arial"/>
-            </a:endParaRPr>
-          </a:p>
-          <a:p>
-            <a:pPr marL="457200" indent="-310680">
+              <a:latin typeface="Arial"/>
+            </a:endParaRPr>
+          </a:p>
+          <a:p>
+            <a:pPr marL="457200" indent="-310320">
               <a:lnSpc>
                 <a:spcPct val="115000"/>
               </a:lnSpc>
@@ -4786,9 +4408,6 @@
               <a:t>Ожидаемое количество сущностей - 80 000</a:t>
             </a:r>
             <a:endParaRPr b="0" lang="en-US" sz="1300" spc="-1" strike="noStrike">
-              <a:solidFill>
-                <a:srgbClr val="000000"/>
-              </a:solidFill>
               <a:latin typeface="Arial"/>
             </a:endParaRPr>
           </a:p>
@@ -4826,14 +4445,14 @@
       </p:grpSpPr>
       <p:sp>
         <p:nvSpPr>
-          <p:cNvPr id="95" name="TextShape 1"/>
-          <p:cNvSpPr txBox="1"/>
+          <p:cNvPr id="93" name="CustomShape 1"/>
+          <p:cNvSpPr/>
           <p:nvPr/>
         </p:nvSpPr>
         <p:spPr>
           <a:xfrm>
             <a:off x="1297440" y="393840"/>
-            <a:ext cx="7038720" cy="913680"/>
+            <a:ext cx="7038360" cy="913320"/>
           </a:xfrm>
           <a:prstGeom prst="rect">
             <a:avLst/>
@@ -4843,8 +4462,14 @@
             <a:noFill/>
           </a:ln>
         </p:spPr>
-        <p:txBody>
-          <a:bodyPr tIns="91440" bIns="91440">
+        <p:style>
+          <a:lnRef idx="0"/>
+          <a:fillRef idx="0"/>
+          <a:effectRef idx="0"/>
+          <a:fontRef idx="minor"/>
+        </p:style>
+        <p:txBody>
+          <a:bodyPr lIns="90000" rIns="90000" tIns="91440" bIns="91440">
             <a:normAutofit/>
           </a:bodyPr>
           <a:p>
@@ -4867,14 +4492,57 @@
               <a:t>Protege - классы и свойства</a:t>
             </a:r>
             <a:endParaRPr b="0" lang="en-US" sz="2400" spc="-1" strike="noStrike">
-              <a:solidFill>
-                <a:srgbClr val="000000"/>
-              </a:solidFill>
-              <a:latin typeface="Arial"/>
-            </a:endParaRPr>
-          </a:p>
-        </p:txBody>
-      </p:sp>
+              <a:latin typeface="Arial"/>
+            </a:endParaRPr>
+          </a:p>
+        </p:txBody>
+      </p:sp>
+      <p:pic>
+        <p:nvPicPr>
+          <p:cNvPr id="94" name="" descr=""/>
+          <p:cNvPicPr/>
+          <p:nvPr/>
+        </p:nvPicPr>
+        <p:blipFill>
+          <a:blip r:embed="rId1"/>
+          <a:stretch/>
+        </p:blipFill>
+        <p:spPr>
+          <a:xfrm>
+            <a:off x="2743200" y="1600200"/>
+            <a:ext cx="2248560" cy="1828440"/>
+          </a:xfrm>
+          <a:prstGeom prst="rect">
+            <a:avLst/>
+          </a:prstGeom>
+          <a:ln w="0">
+            <a:noFill/>
+          </a:ln>
+        </p:spPr>
+      </p:pic>
+      <p:pic>
+        <p:nvPicPr>
+          <p:cNvPr id="95" name="" descr=""/>
+          <p:cNvPicPr/>
+          <p:nvPr/>
+        </p:nvPicPr>
+        <p:blipFill>
+          <a:blip r:embed="rId2"/>
+          <a:stretch/>
+        </p:blipFill>
+        <p:spPr>
+          <a:xfrm>
+            <a:off x="5190120" y="1600920"/>
+            <a:ext cx="1906200" cy="1599120"/>
+          </a:xfrm>
+          <a:prstGeom prst="rect">
+            <a:avLst/>
+          </a:prstGeom>
+          <a:ln w="0">
+            <a:noFill/>
+          </a:ln>
+        </p:spPr>
+      </p:pic>
       <p:pic>
         <p:nvPicPr>
           <p:cNvPr id="96" name="" descr=""/>
@@ -4882,59 +4550,13 @@
           <p:nvPr/>
         </p:nvPicPr>
         <p:blipFill>
-          <a:blip r:embed="rId1"/>
-          <a:stretch/>
-        </p:blipFill>
-        <p:spPr>
-          <a:xfrm>
-            <a:off x="2743200" y="1600200"/>
-            <a:ext cx="2248920" cy="1828800"/>
-          </a:xfrm>
-          <a:prstGeom prst="rect">
-            <a:avLst/>
-          </a:prstGeom>
-          <a:ln w="0">
-            <a:noFill/>
-          </a:ln>
-        </p:spPr>
-      </p:pic>
-      <p:pic>
-        <p:nvPicPr>
-          <p:cNvPr id="97" name="" descr=""/>
-          <p:cNvPicPr/>
-          <p:nvPr/>
-        </p:nvPicPr>
-        <p:blipFill>
-          <a:blip r:embed="rId2"/>
-          <a:stretch/>
-        </p:blipFill>
-        <p:spPr>
-          <a:xfrm>
-            <a:off x="5190120" y="1600920"/>
-            <a:ext cx="1906560" cy="1599480"/>
-          </a:xfrm>
-          <a:prstGeom prst="rect">
-            <a:avLst/>
-          </a:prstGeom>
-          <a:ln w="0">
-            <a:noFill/>
-          </a:ln>
-        </p:spPr>
-      </p:pic>
-      <p:pic>
-        <p:nvPicPr>
-          <p:cNvPr id="98" name="" descr=""/>
-          <p:cNvPicPr/>
-          <p:nvPr/>
-        </p:nvPicPr>
-        <p:blipFill>
           <a:blip r:embed="rId3"/>
           <a:stretch/>
         </p:blipFill>
         <p:spPr>
           <a:xfrm>
             <a:off x="685800" y="1600200"/>
-            <a:ext cx="1893600" cy="2743200"/>
+            <a:ext cx="1893240" cy="2742840"/>
           </a:xfrm>
           <a:prstGeom prst="rect">
             <a:avLst/>
@@ -4976,14 +4598,14 @@
       </p:grpSpPr>
       <p:sp>
         <p:nvSpPr>
-          <p:cNvPr id="99" name="TextShape 1"/>
-          <p:cNvSpPr txBox="1"/>
+          <p:cNvPr id="97" name="CustomShape 1"/>
+          <p:cNvSpPr/>
           <p:nvPr/>
         </p:nvSpPr>
         <p:spPr>
           <a:xfrm>
             <a:off x="1297440" y="1567440"/>
-            <a:ext cx="7038720" cy="2910960"/>
+            <a:ext cx="7038360" cy="2910600"/>
           </a:xfrm>
           <a:prstGeom prst="rect">
             <a:avLst/>
@@ -4993,12 +4615,18 @@
             <a:noFill/>
           </a:ln>
         </p:spPr>
-        <p:txBody>
-          <a:bodyPr tIns="91440" bIns="91440">
-            <a:normAutofit/>
-          </a:bodyPr>
-          <a:p>
-            <a:pPr marL="457200" indent="-323640">
+        <p:style>
+          <a:lnRef idx="0"/>
+          <a:fillRef idx="0"/>
+          <a:effectRef idx="0"/>
+          <a:fontRef idx="minor"/>
+        </p:style>
+        <p:txBody>
+          <a:bodyPr lIns="90000" rIns="90000" tIns="91440" bIns="91440">
+            <a:normAutofit/>
+          </a:bodyPr>
+          <a:p>
+            <a:pPr marL="457200" indent="-323280">
               <a:lnSpc>
                 <a:spcPct val="115000"/>
               </a:lnSpc>
@@ -5019,14 +4647,11 @@
               <a:t>Какие жанры были  популярны в определенный период времени?</a:t>
             </a:r>
             <a:endParaRPr b="0" lang="en-US" sz="1500" spc="-1" strike="noStrike">
-              <a:solidFill>
-                <a:srgbClr val="000000"/>
-              </a:solidFill>
-              <a:latin typeface="Arial"/>
-            </a:endParaRPr>
-          </a:p>
-          <a:p>
-            <a:pPr marL="457200" indent="-323640">
+              <a:latin typeface="Arial"/>
+            </a:endParaRPr>
+          </a:p>
+          <a:p>
+            <a:pPr marL="457200" indent="-323280">
               <a:lnSpc>
                 <a:spcPct val="115000"/>
               </a:lnSpc>
@@ -5044,17 +4669,14 @@
                 <a:latin typeface="Lato"/>
                 <a:ea typeface="Lato"/>
               </a:rPr>
-              <a:t>Какие исполнителя похожи на заданного?</a:t>
+              <a:t>Какие исполнители похожи на заданного?</a:t>
             </a:r>
             <a:endParaRPr b="0" lang="en-US" sz="1500" spc="-1" strike="noStrike">
-              <a:solidFill>
-                <a:srgbClr val="000000"/>
-              </a:solidFill>
-              <a:latin typeface="Arial"/>
-            </a:endParaRPr>
-          </a:p>
-          <a:p>
-            <a:pPr marL="457200" indent="-323640">
+              <a:latin typeface="Arial"/>
+            </a:endParaRPr>
+          </a:p>
+          <a:p>
+            <a:pPr marL="457200" indent="-323280">
               <a:lnSpc>
                 <a:spcPct val="115000"/>
               </a:lnSpc>
@@ -5075,14 +4697,11 @@
               <a:t>Какие исполнители получили определенную награду?</a:t>
             </a:r>
             <a:endParaRPr b="0" lang="en-US" sz="1500" spc="-1" strike="noStrike">
-              <a:solidFill>
-                <a:srgbClr val="000000"/>
-              </a:solidFill>
-              <a:latin typeface="Arial"/>
-            </a:endParaRPr>
-          </a:p>
-          <a:p>
-            <a:pPr marL="457200" indent="-323640">
+              <a:latin typeface="Arial"/>
+            </a:endParaRPr>
+          </a:p>
+          <a:p>
+            <a:pPr marL="457200" indent="-323280">
               <a:lnSpc>
                 <a:spcPct val="115000"/>
               </a:lnSpc>
@@ -5103,14 +4722,11 @@
               <a:t>Какие исполнители исполняли песни на конкретном языке?</a:t>
             </a:r>
             <a:endParaRPr b="0" lang="en-US" sz="1500" spc="-1" strike="noStrike">
-              <a:solidFill>
-                <a:srgbClr val="000000"/>
-              </a:solidFill>
-              <a:latin typeface="Arial"/>
-            </a:endParaRPr>
-          </a:p>
-          <a:p>
-            <a:pPr marL="457200" indent="-323640">
+              <a:latin typeface="Arial"/>
+            </a:endParaRPr>
+          </a:p>
+          <a:p>
+            <a:pPr marL="457200" indent="-323280">
               <a:lnSpc>
                 <a:spcPct val="115000"/>
               </a:lnSpc>
@@ -5131,14 +4747,11 @@
               <a:t>Кто играл в конкретной группе за всю ее историю?</a:t>
             </a:r>
             <a:endParaRPr b="0" lang="en-US" sz="1500" spc="-1" strike="noStrike">
-              <a:solidFill>
-                <a:srgbClr val="000000"/>
-              </a:solidFill>
-              <a:latin typeface="Arial"/>
-            </a:endParaRPr>
-          </a:p>
-          <a:p>
-            <a:pPr marL="457200" indent="-323640">
+              <a:latin typeface="Arial"/>
+            </a:endParaRPr>
+          </a:p>
+          <a:p>
+            <a:pPr marL="457200" indent="-323280">
               <a:lnSpc>
                 <a:spcPct val="115000"/>
               </a:lnSpc>
@@ -5159,24 +4772,21 @@
               <a:t>В каких группах музыкант выступал в течении своей карьеры?</a:t>
             </a:r>
             <a:endParaRPr b="0" lang="en-US" sz="1500" spc="-1" strike="noStrike">
-              <a:solidFill>
-                <a:srgbClr val="000000"/>
-              </a:solidFill>
-              <a:latin typeface="Arial"/>
-            </a:endParaRPr>
-          </a:p>
-        </p:txBody>
-      </p:sp>
-      <p:sp>
-        <p:nvSpPr>
-          <p:cNvPr id="100" name="TextShape 2"/>
-          <p:cNvSpPr txBox="1"/>
+              <a:latin typeface="Arial"/>
+            </a:endParaRPr>
+          </a:p>
+        </p:txBody>
+      </p:sp>
+      <p:sp>
+        <p:nvSpPr>
+          <p:cNvPr id="98" name="CustomShape 2"/>
+          <p:cNvSpPr/>
           <p:nvPr/>
         </p:nvSpPr>
         <p:spPr>
           <a:xfrm>
             <a:off x="1297440" y="393840"/>
-            <a:ext cx="7038720" cy="913680"/>
+            <a:ext cx="7038360" cy="913320"/>
           </a:xfrm>
           <a:prstGeom prst="rect">
             <a:avLst/>
@@ -5186,8 +4796,14 @@
             <a:noFill/>
           </a:ln>
         </p:spPr>
-        <p:txBody>
-          <a:bodyPr tIns="91440" bIns="91440">
+        <p:style>
+          <a:lnRef idx="0"/>
+          <a:fillRef idx="0"/>
+          <a:effectRef idx="0"/>
+          <a:fontRef idx="minor"/>
+        </p:style>
+        <p:txBody>
+          <a:bodyPr lIns="90000" rIns="90000" tIns="91440" bIns="91440">
             <a:normAutofit/>
           </a:bodyPr>
           <a:p>
@@ -5210,9 +4826,6 @@
               <a:t>Компетентностные вопросы</a:t>
             </a:r>
             <a:endParaRPr b="0" lang="en-US" sz="2400" spc="-1" strike="noStrike">
-              <a:solidFill>
-                <a:srgbClr val="000000"/>
-              </a:solidFill>
               <a:latin typeface="Arial"/>
             </a:endParaRPr>
           </a:p>

</xml_diff>